<commit_message>
Presentation updated (added notes to historical list of botnets).
</commit_message>
<xml_diff>
--- a/report/A hands-on approach on botnets.pptx
+++ b/report/A hands-on approach on botnets.pptx
@@ -5697,6 +5697,13 @@
         </dgm:presLayoutVars>
       </dgm:prSet>
       <dgm:spPr/>
+      <dgm:t>
+        <a:bodyPr/>
+        <a:lstStyle/>
+        <a:p>
+          <a:endParaRPr lang="pt-PT"/>
+        </a:p>
+      </dgm:t>
     </dgm:pt>
     <dgm:pt modelId="{33B56EF9-D68C-452B-99F0-067ED0C42EEF}" type="pres">
       <dgm:prSet presAssocID="{4088FA11-DEAC-4DC2-BA6B-303FDE86B0D8}" presName="aSpace" presStyleCnt="0"/>
@@ -6078,18 +6085,46 @@
         </dgm:presLayoutVars>
       </dgm:prSet>
       <dgm:spPr/>
+      <dgm:t>
+        <a:bodyPr/>
+        <a:lstStyle/>
+        <a:p>
+          <a:endParaRPr lang="pt-PT"/>
+        </a:p>
+      </dgm:t>
     </dgm:pt>
     <dgm:pt modelId="{80C63FE0-ABCA-4248-B13B-2DCF078A01AB}" type="pres">
       <dgm:prSet presAssocID="{A75B5C12-32B9-47B7-99AE-6EFED6DB25DA}" presName="centerShape" presStyleLbl="node0" presStyleIdx="0" presStyleCnt="1"/>
       <dgm:spPr/>
+      <dgm:t>
+        <a:bodyPr/>
+        <a:lstStyle/>
+        <a:p>
+          <a:endParaRPr lang="pt-PT"/>
+        </a:p>
+      </dgm:t>
     </dgm:pt>
     <dgm:pt modelId="{5F42F1EE-A2F6-4C01-B4BD-D4B3E6CFB2F9}" type="pres">
       <dgm:prSet presAssocID="{FC978EDC-CBD3-4116-8168-43C0C71309F0}" presName="Name9" presStyleLbl="parChTrans1D2" presStyleIdx="0" presStyleCnt="6"/>
       <dgm:spPr/>
+      <dgm:t>
+        <a:bodyPr/>
+        <a:lstStyle/>
+        <a:p>
+          <a:endParaRPr lang="pt-PT"/>
+        </a:p>
+      </dgm:t>
     </dgm:pt>
     <dgm:pt modelId="{1CC81DC1-C045-4479-89CB-5266A9FFA735}" type="pres">
       <dgm:prSet presAssocID="{FC978EDC-CBD3-4116-8168-43C0C71309F0}" presName="connTx" presStyleLbl="parChTrans1D2" presStyleIdx="0" presStyleCnt="6"/>
       <dgm:spPr/>
+      <dgm:t>
+        <a:bodyPr/>
+        <a:lstStyle/>
+        <a:p>
+          <a:endParaRPr lang="pt-PT"/>
+        </a:p>
+      </dgm:t>
     </dgm:pt>
     <dgm:pt modelId="{C2F53878-8424-4FAD-B7E0-61A7014C2B62}" type="pres">
       <dgm:prSet presAssocID="{778FECAC-C03B-4603-ABFD-2B846239CA54}" presName="node" presStyleLbl="node1" presStyleIdx="0" presStyleCnt="6" custScaleX="118340" custScaleY="117150">
@@ -6098,14 +6133,35 @@
         </dgm:presLayoutVars>
       </dgm:prSet>
       <dgm:spPr/>
+      <dgm:t>
+        <a:bodyPr/>
+        <a:lstStyle/>
+        <a:p>
+          <a:endParaRPr lang="pt-PT"/>
+        </a:p>
+      </dgm:t>
     </dgm:pt>
     <dgm:pt modelId="{0842CC96-15E1-4A58-A03C-851837D9C922}" type="pres">
       <dgm:prSet presAssocID="{255E88B0-7F1D-46DF-ABB5-DB640911D4FF}" presName="Name9" presStyleLbl="parChTrans1D2" presStyleIdx="1" presStyleCnt="6"/>
       <dgm:spPr/>
+      <dgm:t>
+        <a:bodyPr/>
+        <a:lstStyle/>
+        <a:p>
+          <a:endParaRPr lang="pt-PT"/>
+        </a:p>
+      </dgm:t>
     </dgm:pt>
     <dgm:pt modelId="{6CEBA27B-D46B-40B4-9F69-5181C2FE1791}" type="pres">
       <dgm:prSet presAssocID="{255E88B0-7F1D-46DF-ABB5-DB640911D4FF}" presName="connTx" presStyleLbl="parChTrans1D2" presStyleIdx="1" presStyleCnt="6"/>
       <dgm:spPr/>
+      <dgm:t>
+        <a:bodyPr/>
+        <a:lstStyle/>
+        <a:p>
+          <a:endParaRPr lang="pt-PT"/>
+        </a:p>
+      </dgm:t>
     </dgm:pt>
     <dgm:pt modelId="{CDD72D90-498B-4C41-91F2-8230D53C14E6}" type="pres">
       <dgm:prSet presAssocID="{01642865-0D1B-40A2-9955-6750AE493696}" presName="node" presStyleLbl="node1" presStyleIdx="1" presStyleCnt="6" custScaleX="118340" custScaleY="117150">
@@ -6114,14 +6170,35 @@
         </dgm:presLayoutVars>
       </dgm:prSet>
       <dgm:spPr/>
+      <dgm:t>
+        <a:bodyPr/>
+        <a:lstStyle/>
+        <a:p>
+          <a:endParaRPr lang="pt-PT"/>
+        </a:p>
+      </dgm:t>
     </dgm:pt>
     <dgm:pt modelId="{03837173-0E9B-4E05-A332-979929B9AC85}" type="pres">
       <dgm:prSet presAssocID="{9A67771C-9647-453B-AAE8-88FF29E2C60E}" presName="Name9" presStyleLbl="parChTrans1D2" presStyleIdx="2" presStyleCnt="6"/>
       <dgm:spPr/>
+      <dgm:t>
+        <a:bodyPr/>
+        <a:lstStyle/>
+        <a:p>
+          <a:endParaRPr lang="pt-PT"/>
+        </a:p>
+      </dgm:t>
     </dgm:pt>
     <dgm:pt modelId="{6ED6F47B-29CA-4B96-A4C6-FA1F5E521DA9}" type="pres">
       <dgm:prSet presAssocID="{9A67771C-9647-453B-AAE8-88FF29E2C60E}" presName="connTx" presStyleLbl="parChTrans1D2" presStyleIdx="2" presStyleCnt="6"/>
       <dgm:spPr/>
+      <dgm:t>
+        <a:bodyPr/>
+        <a:lstStyle/>
+        <a:p>
+          <a:endParaRPr lang="pt-PT"/>
+        </a:p>
+      </dgm:t>
     </dgm:pt>
     <dgm:pt modelId="{B212C31C-69AA-472B-BF2B-C87B1B4F41A7}" type="pres">
       <dgm:prSet presAssocID="{38DADBB7-ED37-43BC-8C9B-7E8BF86E8AB7}" presName="node" presStyleLbl="node1" presStyleIdx="2" presStyleCnt="6" custScaleX="118340" custScaleY="117150">
@@ -6130,14 +6207,35 @@
         </dgm:presLayoutVars>
       </dgm:prSet>
       <dgm:spPr/>
+      <dgm:t>
+        <a:bodyPr/>
+        <a:lstStyle/>
+        <a:p>
+          <a:endParaRPr lang="pt-PT"/>
+        </a:p>
+      </dgm:t>
     </dgm:pt>
     <dgm:pt modelId="{07F6CE9C-5BA3-4C48-8D71-08EF7F495C24}" type="pres">
       <dgm:prSet presAssocID="{4F154B9D-3A4C-4473-ACA7-48E96645E565}" presName="Name9" presStyleLbl="parChTrans1D2" presStyleIdx="3" presStyleCnt="6"/>
       <dgm:spPr/>
+      <dgm:t>
+        <a:bodyPr/>
+        <a:lstStyle/>
+        <a:p>
+          <a:endParaRPr lang="pt-PT"/>
+        </a:p>
+      </dgm:t>
     </dgm:pt>
     <dgm:pt modelId="{8A61E592-AE7F-4550-88F4-769F6A619BD3}" type="pres">
       <dgm:prSet presAssocID="{4F154B9D-3A4C-4473-ACA7-48E96645E565}" presName="connTx" presStyleLbl="parChTrans1D2" presStyleIdx="3" presStyleCnt="6"/>
       <dgm:spPr/>
+      <dgm:t>
+        <a:bodyPr/>
+        <a:lstStyle/>
+        <a:p>
+          <a:endParaRPr lang="pt-PT"/>
+        </a:p>
+      </dgm:t>
     </dgm:pt>
     <dgm:pt modelId="{5AF06DD3-AF6D-4F0F-BD35-33A3E13933D9}" type="pres">
       <dgm:prSet presAssocID="{BFC8BDF1-78DB-4655-A4E3-CF8B153D4676}" presName="node" presStyleLbl="node1" presStyleIdx="3" presStyleCnt="6" custScaleX="118340" custScaleY="117150">
@@ -6146,14 +6244,35 @@
         </dgm:presLayoutVars>
       </dgm:prSet>
       <dgm:spPr/>
+      <dgm:t>
+        <a:bodyPr/>
+        <a:lstStyle/>
+        <a:p>
+          <a:endParaRPr lang="pt-PT"/>
+        </a:p>
+      </dgm:t>
     </dgm:pt>
     <dgm:pt modelId="{FA112148-27C9-40DD-A9E3-239F1E25847D}" type="pres">
       <dgm:prSet presAssocID="{58036C44-998C-422F-BF7D-D945DC20EC06}" presName="Name9" presStyleLbl="parChTrans1D2" presStyleIdx="4" presStyleCnt="6"/>
       <dgm:spPr/>
+      <dgm:t>
+        <a:bodyPr/>
+        <a:lstStyle/>
+        <a:p>
+          <a:endParaRPr lang="pt-PT"/>
+        </a:p>
+      </dgm:t>
     </dgm:pt>
     <dgm:pt modelId="{10FAA0C4-9599-4547-A94C-8B4332FFA131}" type="pres">
       <dgm:prSet presAssocID="{58036C44-998C-422F-BF7D-D945DC20EC06}" presName="connTx" presStyleLbl="parChTrans1D2" presStyleIdx="4" presStyleCnt="6"/>
       <dgm:spPr/>
+      <dgm:t>
+        <a:bodyPr/>
+        <a:lstStyle/>
+        <a:p>
+          <a:endParaRPr lang="pt-PT"/>
+        </a:p>
+      </dgm:t>
     </dgm:pt>
     <dgm:pt modelId="{0564B829-A6AA-4522-9004-59A45B6F5426}" type="pres">
       <dgm:prSet presAssocID="{DA9618EA-0EC7-44B5-B66E-5B04FFCE57A0}" presName="node" presStyleLbl="node1" presStyleIdx="4" presStyleCnt="6" custScaleX="118340" custScaleY="117150">
@@ -6162,14 +6281,35 @@
         </dgm:presLayoutVars>
       </dgm:prSet>
       <dgm:spPr/>
+      <dgm:t>
+        <a:bodyPr/>
+        <a:lstStyle/>
+        <a:p>
+          <a:endParaRPr lang="pt-PT"/>
+        </a:p>
+      </dgm:t>
     </dgm:pt>
     <dgm:pt modelId="{F3C04A6A-A68C-44C7-B1C3-4C17CC402B5C}" type="pres">
       <dgm:prSet presAssocID="{FF809CBA-8C25-454A-99F3-664DBBD39BF2}" presName="Name9" presStyleLbl="parChTrans1D2" presStyleIdx="5" presStyleCnt="6"/>
       <dgm:spPr/>
+      <dgm:t>
+        <a:bodyPr/>
+        <a:lstStyle/>
+        <a:p>
+          <a:endParaRPr lang="pt-PT"/>
+        </a:p>
+      </dgm:t>
     </dgm:pt>
     <dgm:pt modelId="{2EC18DF2-09AC-4EA7-9C4E-705C8A61D790}" type="pres">
       <dgm:prSet presAssocID="{FF809CBA-8C25-454A-99F3-664DBBD39BF2}" presName="connTx" presStyleLbl="parChTrans1D2" presStyleIdx="5" presStyleCnt="6"/>
       <dgm:spPr/>
+      <dgm:t>
+        <a:bodyPr/>
+        <a:lstStyle/>
+        <a:p>
+          <a:endParaRPr lang="pt-PT"/>
+        </a:p>
+      </dgm:t>
     </dgm:pt>
     <dgm:pt modelId="{16FF8462-D75A-4256-A9FF-A3687EE875ED}" type="pres">
       <dgm:prSet presAssocID="{F58A2E06-B225-45AD-B626-484D03F988AF}" presName="node" presStyleLbl="node1" presStyleIdx="5" presStyleCnt="6" custScaleX="118340" custScaleY="117150">
@@ -6178,36 +6318,43 @@
         </dgm:presLayoutVars>
       </dgm:prSet>
       <dgm:spPr/>
+      <dgm:t>
+        <a:bodyPr/>
+        <a:lstStyle/>
+        <a:p>
+          <a:endParaRPr lang="pt-PT"/>
+        </a:p>
+      </dgm:t>
     </dgm:pt>
   </dgm:ptLst>
   <dgm:cxnLst>
+    <dgm:cxn modelId="{660D182C-7465-4ADF-9490-4865D746FBAD}" type="presOf" srcId="{FC978EDC-CBD3-4116-8168-43C0C71309F0}" destId="{1CC81DC1-C045-4479-89CB-5266A9FFA735}" srcOrd="1" destOrd="0" presId="urn:microsoft.com/office/officeart/2005/8/layout/radial1"/>
+    <dgm:cxn modelId="{BDBFC24D-9EE3-4069-9BB9-5A448293FB7D}" srcId="{9FB2035D-99D8-4811-A0DE-36CED1046595}" destId="{A75B5C12-32B9-47B7-99AE-6EFED6DB25DA}" srcOrd="0" destOrd="0" parTransId="{3C333CBB-E0C8-405E-BF09-920CBC0AFDBB}" sibTransId="{1BE555CF-7F04-411D-8CB0-087258BDE564}"/>
+    <dgm:cxn modelId="{C8EBEF8D-733C-42DA-846B-83B132728B0A}" type="presOf" srcId="{FF809CBA-8C25-454A-99F3-664DBBD39BF2}" destId="{F3C04A6A-A68C-44C7-B1C3-4C17CC402B5C}" srcOrd="0" destOrd="0" presId="urn:microsoft.com/office/officeart/2005/8/layout/radial1"/>
+    <dgm:cxn modelId="{174E4A0E-001E-4C18-8F59-1072952C47E5}" srcId="{A75B5C12-32B9-47B7-99AE-6EFED6DB25DA}" destId="{DA9618EA-0EC7-44B5-B66E-5B04FFCE57A0}" srcOrd="4" destOrd="0" parTransId="{58036C44-998C-422F-BF7D-D945DC20EC06}" sibTransId="{1DDC7193-AED3-4874-915F-F32629BA6ECE}"/>
+    <dgm:cxn modelId="{2DAC4AA5-1C19-4BD8-AC45-505190119C82}" type="presOf" srcId="{4F154B9D-3A4C-4473-ACA7-48E96645E565}" destId="{07F6CE9C-5BA3-4C48-8D71-08EF7F495C24}" srcOrd="0" destOrd="0" presId="urn:microsoft.com/office/officeart/2005/8/layout/radial1"/>
+    <dgm:cxn modelId="{CDF11469-0D9B-4D5A-9B68-6C42DEE44566}" type="presOf" srcId="{58036C44-998C-422F-BF7D-D945DC20EC06}" destId="{10FAA0C4-9599-4547-A94C-8B4332FFA131}" srcOrd="1" destOrd="0" presId="urn:microsoft.com/office/officeart/2005/8/layout/radial1"/>
+    <dgm:cxn modelId="{D1D23CF4-0DDB-47C7-8E8A-508BEEB308D3}" type="presOf" srcId="{9A67771C-9647-453B-AAE8-88FF29E2C60E}" destId="{6ED6F47B-29CA-4B96-A4C6-FA1F5E521DA9}" srcOrd="1" destOrd="0" presId="urn:microsoft.com/office/officeart/2005/8/layout/radial1"/>
+    <dgm:cxn modelId="{9C70692C-9A11-4A04-926C-E352CB483F41}" srcId="{A75B5C12-32B9-47B7-99AE-6EFED6DB25DA}" destId="{01642865-0D1B-40A2-9955-6750AE493696}" srcOrd="1" destOrd="0" parTransId="{255E88B0-7F1D-46DF-ABB5-DB640911D4FF}" sibTransId="{94AE055D-904F-400C-A4A7-8704904FCB01}"/>
+    <dgm:cxn modelId="{08E397CB-A479-410F-9667-B304C91AF6FA}" type="presOf" srcId="{FF809CBA-8C25-454A-99F3-664DBBD39BF2}" destId="{2EC18DF2-09AC-4EA7-9C4E-705C8A61D790}" srcOrd="1" destOrd="0" presId="urn:microsoft.com/office/officeart/2005/8/layout/radial1"/>
+    <dgm:cxn modelId="{52DDB334-3F67-4937-95BE-046D0F7BA131}" type="presOf" srcId="{9FB2035D-99D8-4811-A0DE-36CED1046595}" destId="{F43DD3CD-CBC1-4FAB-A133-8DCD18E0A25A}" srcOrd="0" destOrd="0" presId="urn:microsoft.com/office/officeart/2005/8/layout/radial1"/>
+    <dgm:cxn modelId="{F21F68B1-7878-4C52-BD42-B5D3754F5DB8}" type="presOf" srcId="{255E88B0-7F1D-46DF-ABB5-DB640911D4FF}" destId="{6CEBA27B-D46B-40B4-9F69-5181C2FE1791}" srcOrd="1" destOrd="0" presId="urn:microsoft.com/office/officeart/2005/8/layout/radial1"/>
     <dgm:cxn modelId="{C9EEEB40-A565-4B5B-8A20-9DD7F5A5B6B2}" type="presOf" srcId="{9A67771C-9647-453B-AAE8-88FF29E2C60E}" destId="{03837173-0E9B-4E05-A332-979929B9AC85}" srcOrd="0" destOrd="0" presId="urn:microsoft.com/office/officeart/2005/8/layout/radial1"/>
-    <dgm:cxn modelId="{2DAC4AA5-1C19-4BD8-AC45-505190119C82}" type="presOf" srcId="{4F154B9D-3A4C-4473-ACA7-48E96645E565}" destId="{07F6CE9C-5BA3-4C48-8D71-08EF7F495C24}" srcOrd="0" destOrd="0" presId="urn:microsoft.com/office/officeart/2005/8/layout/radial1"/>
+    <dgm:cxn modelId="{7911CDC6-497A-44FB-B1BE-33A067010263}" type="presOf" srcId="{58036C44-998C-422F-BF7D-D945DC20EC06}" destId="{FA112148-27C9-40DD-A9E3-239F1E25847D}" srcOrd="0" destOrd="0" presId="urn:microsoft.com/office/officeart/2005/8/layout/radial1"/>
+    <dgm:cxn modelId="{A8BF4449-097E-4B31-AF0A-A085BCE9892D}" type="presOf" srcId="{FC978EDC-CBD3-4116-8168-43C0C71309F0}" destId="{5F42F1EE-A2F6-4C01-B4BD-D4B3E6CFB2F9}" srcOrd="0" destOrd="0" presId="urn:microsoft.com/office/officeart/2005/8/layout/radial1"/>
+    <dgm:cxn modelId="{8FE73802-1102-4B15-9A07-C6510311D98C}" type="presOf" srcId="{DA9618EA-0EC7-44B5-B66E-5B04FFCE57A0}" destId="{0564B829-A6AA-4522-9004-59A45B6F5426}" srcOrd="0" destOrd="0" presId="urn:microsoft.com/office/officeart/2005/8/layout/radial1"/>
     <dgm:cxn modelId="{FA41DC17-3090-4CE3-AB7A-BFBCE51D8337}" srcId="{A75B5C12-32B9-47B7-99AE-6EFED6DB25DA}" destId="{38DADBB7-ED37-43BC-8C9B-7E8BF86E8AB7}" srcOrd="2" destOrd="0" parTransId="{9A67771C-9647-453B-AAE8-88FF29E2C60E}" sibTransId="{A7316F92-B2D8-47ED-BC41-A9B295452B48}"/>
-    <dgm:cxn modelId="{D1D23CF4-0DDB-47C7-8E8A-508BEEB308D3}" type="presOf" srcId="{9A67771C-9647-453B-AAE8-88FF29E2C60E}" destId="{6ED6F47B-29CA-4B96-A4C6-FA1F5E521DA9}" srcOrd="1" destOrd="0" presId="urn:microsoft.com/office/officeart/2005/8/layout/radial1"/>
     <dgm:cxn modelId="{F3BC774B-4001-496D-B4AD-957D2E28C2E8}" type="presOf" srcId="{A75B5C12-32B9-47B7-99AE-6EFED6DB25DA}" destId="{80C63FE0-ABCA-4248-B13B-2DCF078A01AB}" srcOrd="0" destOrd="0" presId="urn:microsoft.com/office/officeart/2005/8/layout/radial1"/>
+    <dgm:cxn modelId="{C5C663AB-CA85-4505-8302-480AC039E1DE}" type="presOf" srcId="{F58A2E06-B225-45AD-B626-484D03F988AF}" destId="{16FF8462-D75A-4256-A9FF-A3687EE875ED}" srcOrd="0" destOrd="0" presId="urn:microsoft.com/office/officeart/2005/8/layout/radial1"/>
+    <dgm:cxn modelId="{7D085D86-90A5-4630-BFA0-BF2B11C84EAB}" srcId="{A75B5C12-32B9-47B7-99AE-6EFED6DB25DA}" destId="{F58A2E06-B225-45AD-B626-484D03F988AF}" srcOrd="5" destOrd="0" parTransId="{FF809CBA-8C25-454A-99F3-664DBBD39BF2}" sibTransId="{940EE590-BAA5-4529-AF97-B529DD23F931}"/>
+    <dgm:cxn modelId="{E25BDB28-46C8-422A-A0E5-7EE8ECCF7243}" type="presOf" srcId="{778FECAC-C03B-4603-ABFD-2B846239CA54}" destId="{C2F53878-8424-4FAD-B7E0-61A7014C2B62}" srcOrd="0" destOrd="0" presId="urn:microsoft.com/office/officeart/2005/8/layout/radial1"/>
+    <dgm:cxn modelId="{61490C96-F63D-44B4-8577-58873EE40735}" srcId="{A75B5C12-32B9-47B7-99AE-6EFED6DB25DA}" destId="{BFC8BDF1-78DB-4655-A4E3-CF8B153D4676}" srcOrd="3" destOrd="0" parTransId="{4F154B9D-3A4C-4473-ACA7-48E96645E565}" sibTransId="{95E5BFF9-DC45-46A9-9082-DBE678207EA7}"/>
+    <dgm:cxn modelId="{8EB07D75-2A76-4F6D-B210-BE23B03753C1}" type="presOf" srcId="{4F154B9D-3A4C-4473-ACA7-48E96645E565}" destId="{8A61E592-AE7F-4550-88F4-769F6A619BD3}" srcOrd="1" destOrd="0" presId="urn:microsoft.com/office/officeart/2005/8/layout/radial1"/>
+    <dgm:cxn modelId="{249A6226-93AC-4ECC-97BF-F8C2C40AA96E}" type="presOf" srcId="{BFC8BDF1-78DB-4655-A4E3-CF8B153D4676}" destId="{5AF06DD3-AF6D-4F0F-BD35-33A3E13933D9}" srcOrd="0" destOrd="0" presId="urn:microsoft.com/office/officeart/2005/8/layout/radial1"/>
+    <dgm:cxn modelId="{8447C607-CA80-41D7-A004-CC480E95A13B}" srcId="{A75B5C12-32B9-47B7-99AE-6EFED6DB25DA}" destId="{778FECAC-C03B-4603-ABFD-2B846239CA54}" srcOrd="0" destOrd="0" parTransId="{FC978EDC-CBD3-4116-8168-43C0C71309F0}" sibTransId="{7E685D49-49E7-48CA-9581-4DEB6895A28A}"/>
+    <dgm:cxn modelId="{E453C22D-82FA-4E4F-BE07-C9075AD42BF6}" type="presOf" srcId="{01642865-0D1B-40A2-9955-6750AE493696}" destId="{CDD72D90-498B-4C41-91F2-8230D53C14E6}" srcOrd="0" destOrd="0" presId="urn:microsoft.com/office/officeart/2005/8/layout/radial1"/>
+    <dgm:cxn modelId="{62920192-76E6-48BC-B15D-1000E61F13EE}" type="presOf" srcId="{38DADBB7-ED37-43BC-8C9B-7E8BF86E8AB7}" destId="{B212C31C-69AA-472B-BF2B-C87B1B4F41A7}" srcOrd="0" destOrd="0" presId="urn:microsoft.com/office/officeart/2005/8/layout/radial1"/>
     <dgm:cxn modelId="{FFB09D4B-04E6-4478-9EE4-A16666970DAA}" type="presOf" srcId="{255E88B0-7F1D-46DF-ABB5-DB640911D4FF}" destId="{0842CC96-15E1-4A58-A03C-851837D9C922}" srcOrd="0" destOrd="0" presId="urn:microsoft.com/office/officeart/2005/8/layout/radial1"/>
-    <dgm:cxn modelId="{249A6226-93AC-4ECC-97BF-F8C2C40AA96E}" type="presOf" srcId="{BFC8BDF1-78DB-4655-A4E3-CF8B153D4676}" destId="{5AF06DD3-AF6D-4F0F-BD35-33A3E13933D9}" srcOrd="0" destOrd="0" presId="urn:microsoft.com/office/officeart/2005/8/layout/radial1"/>
-    <dgm:cxn modelId="{8FE73802-1102-4B15-9A07-C6510311D98C}" type="presOf" srcId="{DA9618EA-0EC7-44B5-B66E-5B04FFCE57A0}" destId="{0564B829-A6AA-4522-9004-59A45B6F5426}" srcOrd="0" destOrd="0" presId="urn:microsoft.com/office/officeart/2005/8/layout/radial1"/>
-    <dgm:cxn modelId="{C5C663AB-CA85-4505-8302-480AC039E1DE}" type="presOf" srcId="{F58A2E06-B225-45AD-B626-484D03F988AF}" destId="{16FF8462-D75A-4256-A9FF-A3687EE875ED}" srcOrd="0" destOrd="0" presId="urn:microsoft.com/office/officeart/2005/8/layout/radial1"/>
-    <dgm:cxn modelId="{BDBFC24D-9EE3-4069-9BB9-5A448293FB7D}" srcId="{9FB2035D-99D8-4811-A0DE-36CED1046595}" destId="{A75B5C12-32B9-47B7-99AE-6EFED6DB25DA}" srcOrd="0" destOrd="0" parTransId="{3C333CBB-E0C8-405E-BF09-920CBC0AFDBB}" sibTransId="{1BE555CF-7F04-411D-8CB0-087258BDE564}"/>
-    <dgm:cxn modelId="{7D085D86-90A5-4630-BFA0-BF2B11C84EAB}" srcId="{A75B5C12-32B9-47B7-99AE-6EFED6DB25DA}" destId="{F58A2E06-B225-45AD-B626-484D03F988AF}" srcOrd="5" destOrd="0" parTransId="{FF809CBA-8C25-454A-99F3-664DBBD39BF2}" sibTransId="{940EE590-BAA5-4529-AF97-B529DD23F931}"/>
-    <dgm:cxn modelId="{62920192-76E6-48BC-B15D-1000E61F13EE}" type="presOf" srcId="{38DADBB7-ED37-43BC-8C9B-7E8BF86E8AB7}" destId="{B212C31C-69AA-472B-BF2B-C87B1B4F41A7}" srcOrd="0" destOrd="0" presId="urn:microsoft.com/office/officeart/2005/8/layout/radial1"/>
-    <dgm:cxn modelId="{7911CDC6-497A-44FB-B1BE-33A067010263}" type="presOf" srcId="{58036C44-998C-422F-BF7D-D945DC20EC06}" destId="{FA112148-27C9-40DD-A9E3-239F1E25847D}" srcOrd="0" destOrd="0" presId="urn:microsoft.com/office/officeart/2005/8/layout/radial1"/>
-    <dgm:cxn modelId="{174E4A0E-001E-4C18-8F59-1072952C47E5}" srcId="{A75B5C12-32B9-47B7-99AE-6EFED6DB25DA}" destId="{DA9618EA-0EC7-44B5-B66E-5B04FFCE57A0}" srcOrd="4" destOrd="0" parTransId="{58036C44-998C-422F-BF7D-D945DC20EC06}" sibTransId="{1DDC7193-AED3-4874-915F-F32629BA6ECE}"/>
-    <dgm:cxn modelId="{08E397CB-A479-410F-9667-B304C91AF6FA}" type="presOf" srcId="{FF809CBA-8C25-454A-99F3-664DBBD39BF2}" destId="{2EC18DF2-09AC-4EA7-9C4E-705C8A61D790}" srcOrd="1" destOrd="0" presId="urn:microsoft.com/office/officeart/2005/8/layout/radial1"/>
-    <dgm:cxn modelId="{8EB07D75-2A76-4F6D-B210-BE23B03753C1}" type="presOf" srcId="{4F154B9D-3A4C-4473-ACA7-48E96645E565}" destId="{8A61E592-AE7F-4550-88F4-769F6A619BD3}" srcOrd="1" destOrd="0" presId="urn:microsoft.com/office/officeart/2005/8/layout/radial1"/>
-    <dgm:cxn modelId="{A8BF4449-097E-4B31-AF0A-A085BCE9892D}" type="presOf" srcId="{FC978EDC-CBD3-4116-8168-43C0C71309F0}" destId="{5F42F1EE-A2F6-4C01-B4BD-D4B3E6CFB2F9}" srcOrd="0" destOrd="0" presId="urn:microsoft.com/office/officeart/2005/8/layout/radial1"/>
-    <dgm:cxn modelId="{660D182C-7465-4ADF-9490-4865D746FBAD}" type="presOf" srcId="{FC978EDC-CBD3-4116-8168-43C0C71309F0}" destId="{1CC81DC1-C045-4479-89CB-5266A9FFA735}" srcOrd="1" destOrd="0" presId="urn:microsoft.com/office/officeart/2005/8/layout/radial1"/>
-    <dgm:cxn modelId="{E453C22D-82FA-4E4F-BE07-C9075AD42BF6}" type="presOf" srcId="{01642865-0D1B-40A2-9955-6750AE493696}" destId="{CDD72D90-498B-4C41-91F2-8230D53C14E6}" srcOrd="0" destOrd="0" presId="urn:microsoft.com/office/officeart/2005/8/layout/radial1"/>
-    <dgm:cxn modelId="{E25BDB28-46C8-422A-A0E5-7EE8ECCF7243}" type="presOf" srcId="{778FECAC-C03B-4603-ABFD-2B846239CA54}" destId="{C2F53878-8424-4FAD-B7E0-61A7014C2B62}" srcOrd="0" destOrd="0" presId="urn:microsoft.com/office/officeart/2005/8/layout/radial1"/>
-    <dgm:cxn modelId="{C8EBEF8D-733C-42DA-846B-83B132728B0A}" type="presOf" srcId="{FF809CBA-8C25-454A-99F3-664DBBD39BF2}" destId="{F3C04A6A-A68C-44C7-B1C3-4C17CC402B5C}" srcOrd="0" destOrd="0" presId="urn:microsoft.com/office/officeart/2005/8/layout/radial1"/>
-    <dgm:cxn modelId="{52DDB334-3F67-4937-95BE-046D0F7BA131}" type="presOf" srcId="{9FB2035D-99D8-4811-A0DE-36CED1046595}" destId="{F43DD3CD-CBC1-4FAB-A133-8DCD18E0A25A}" srcOrd="0" destOrd="0" presId="urn:microsoft.com/office/officeart/2005/8/layout/radial1"/>
-    <dgm:cxn modelId="{CDF11469-0D9B-4D5A-9B68-6C42DEE44566}" type="presOf" srcId="{58036C44-998C-422F-BF7D-D945DC20EC06}" destId="{10FAA0C4-9599-4547-A94C-8B4332FFA131}" srcOrd="1" destOrd="0" presId="urn:microsoft.com/office/officeart/2005/8/layout/radial1"/>
-    <dgm:cxn modelId="{F21F68B1-7878-4C52-BD42-B5D3754F5DB8}" type="presOf" srcId="{255E88B0-7F1D-46DF-ABB5-DB640911D4FF}" destId="{6CEBA27B-D46B-40B4-9F69-5181C2FE1791}" srcOrd="1" destOrd="0" presId="urn:microsoft.com/office/officeart/2005/8/layout/radial1"/>
-    <dgm:cxn modelId="{9C70692C-9A11-4A04-926C-E352CB483F41}" srcId="{A75B5C12-32B9-47B7-99AE-6EFED6DB25DA}" destId="{01642865-0D1B-40A2-9955-6750AE493696}" srcOrd="1" destOrd="0" parTransId="{255E88B0-7F1D-46DF-ABB5-DB640911D4FF}" sibTransId="{94AE055D-904F-400C-A4A7-8704904FCB01}"/>
-    <dgm:cxn modelId="{61490C96-F63D-44B4-8577-58873EE40735}" srcId="{A75B5C12-32B9-47B7-99AE-6EFED6DB25DA}" destId="{BFC8BDF1-78DB-4655-A4E3-CF8B153D4676}" srcOrd="3" destOrd="0" parTransId="{4F154B9D-3A4C-4473-ACA7-48E96645E565}" sibTransId="{95E5BFF9-DC45-46A9-9082-DBE678207EA7}"/>
-    <dgm:cxn modelId="{8447C607-CA80-41D7-A004-CC480E95A13B}" srcId="{A75B5C12-32B9-47B7-99AE-6EFED6DB25DA}" destId="{778FECAC-C03B-4603-ABFD-2B846239CA54}" srcOrd="0" destOrd="0" parTransId="{FC978EDC-CBD3-4116-8168-43C0C71309F0}" sibTransId="{7E685D49-49E7-48CA-9581-4DEB6895A28A}"/>
     <dgm:cxn modelId="{1D10A6DC-8006-4B87-914B-4A4DA994C71D}" type="presParOf" srcId="{F43DD3CD-CBC1-4FAB-A133-8DCD18E0A25A}" destId="{80C63FE0-ABCA-4248-B13B-2DCF078A01AB}" srcOrd="0" destOrd="0" presId="urn:microsoft.com/office/officeart/2005/8/layout/radial1"/>
     <dgm:cxn modelId="{194B60E2-DC11-4A13-8582-83698DBAF9B4}" type="presParOf" srcId="{F43DD3CD-CBC1-4FAB-A133-8DCD18E0A25A}" destId="{5F42F1EE-A2F6-4C01-B4BD-D4B3E6CFB2F9}" srcOrd="1" destOrd="0" presId="urn:microsoft.com/office/officeart/2005/8/layout/radial1"/>
     <dgm:cxn modelId="{7B94B605-010A-47EE-9080-7F598F82635B}" type="presParOf" srcId="{5F42F1EE-A2F6-4C01-B4BD-D4B3E6CFB2F9}" destId="{1CC81DC1-C045-4479-89CB-5266A9FFA735}" srcOrd="0" destOrd="0" presId="urn:microsoft.com/office/officeart/2005/8/layout/radial1"/>
@@ -6754,6 +6901,13 @@
         </dgm:presLayoutVars>
       </dgm:prSet>
       <dgm:spPr/>
+      <dgm:t>
+        <a:bodyPr/>
+        <a:lstStyle/>
+        <a:p>
+          <a:endParaRPr lang="pt-PT"/>
+        </a:p>
+      </dgm:t>
     </dgm:pt>
     <dgm:pt modelId="{5E4C8283-91A2-4670-96B8-6ABDCC6F2CEE}" type="pres">
       <dgm:prSet presAssocID="{9FF5C2F6-268D-40A4-93A0-DCD6419064C4}" presName="composite" presStyleCnt="0"/>
@@ -6767,6 +6921,13 @@
         </dgm:presLayoutVars>
       </dgm:prSet>
       <dgm:spPr/>
+      <dgm:t>
+        <a:bodyPr/>
+        <a:lstStyle/>
+        <a:p>
+          <a:endParaRPr lang="pt-PT"/>
+        </a:p>
+      </dgm:t>
     </dgm:pt>
     <dgm:pt modelId="{17627E75-CA30-41E0-BF67-18A0E413801B}" type="pres">
       <dgm:prSet presAssocID="{9FF5C2F6-268D-40A4-93A0-DCD6419064C4}" presName="descendantText" presStyleLbl="alignAcc1" presStyleIdx="0" presStyleCnt="3">
@@ -6838,6 +6999,13 @@
         </dgm:presLayoutVars>
       </dgm:prSet>
       <dgm:spPr/>
+      <dgm:t>
+        <a:bodyPr/>
+        <a:lstStyle/>
+        <a:p>
+          <a:endParaRPr lang="pt-PT"/>
+        </a:p>
+      </dgm:t>
     </dgm:pt>
     <dgm:pt modelId="{507CF799-E711-49F8-A10E-7F4E558229A3}" type="pres">
       <dgm:prSet presAssocID="{AEF0A3D8-84FA-4697-BC0A-8C6CF4A58B8F}" presName="descendantText" presStyleLbl="alignAcc1" presStyleIdx="2" presStyleCnt="3">
@@ -6864,16 +7032,16 @@
     <dgm:cxn modelId="{32C1E810-7D18-4717-809D-151A3DD87D72}" srcId="{9BAAD860-2243-4C38-937A-46A8310B4CBA}" destId="{EFF165B5-0DCB-4231-9D60-26CAC6F538CF}" srcOrd="0" destOrd="0" parTransId="{4CC1E301-51F4-4837-ADD4-AEB4DDECD837}" sibTransId="{2F081F79-924C-430C-A974-CAB0ED8F3237}"/>
     <dgm:cxn modelId="{9A6CE063-F52A-4F64-AD80-36F27F9DD3A0}" srcId="{9FF5C2F6-268D-40A4-93A0-DCD6419064C4}" destId="{B0B2B549-CA1B-438D-83C4-44E9B2870F8B}" srcOrd="0" destOrd="0" parTransId="{F5BA9E90-985C-42C2-9CC4-5C92E53C9BC8}" sibTransId="{E286A52F-A252-49D9-8B0A-06AF18A55ECE}"/>
     <dgm:cxn modelId="{04132807-924F-4C5E-A228-425192F50BF6}" srcId="{AEF0A3D8-84FA-4697-BC0A-8C6CF4A58B8F}" destId="{3D6D031E-45F3-4429-8BD1-480D282BD0F9}" srcOrd="1" destOrd="0" parTransId="{33E70EC5-6D83-4E33-9467-767B5BB5F30B}" sibTransId="{C3F8EDAA-4D66-45FE-83A0-75DF9D166786}"/>
+    <dgm:cxn modelId="{48C21826-736E-44C8-98E6-CE883EB0E00A}" type="presOf" srcId="{22CD445C-864B-4579-A434-E3464C7AF263}" destId="{17627E75-CA30-41E0-BF67-18A0E413801B}" srcOrd="0" destOrd="1" presId="urn:microsoft.com/office/officeart/2005/8/layout/chevron2"/>
     <dgm:cxn modelId="{352C0568-2315-4B33-B1BA-9482FBD161B8}" type="presOf" srcId="{AEF0A3D8-84FA-4697-BC0A-8C6CF4A58B8F}" destId="{89DEC15B-B7E5-4F84-A1B5-D0F7F2F822C8}" srcOrd="0" destOrd="0" presId="urn:microsoft.com/office/officeart/2005/8/layout/chevron2"/>
-    <dgm:cxn modelId="{48C21826-736E-44C8-98E6-CE883EB0E00A}" type="presOf" srcId="{22CD445C-864B-4579-A434-E3464C7AF263}" destId="{17627E75-CA30-41E0-BF67-18A0E413801B}" srcOrd="0" destOrd="1" presId="urn:microsoft.com/office/officeart/2005/8/layout/chevron2"/>
     <dgm:cxn modelId="{3BEC91E1-1963-410C-BCEA-3557FE53EC20}" type="presOf" srcId="{77EC20F4-BF3E-48EC-BBEB-7FFD1E0DE96E}" destId="{E3AE7ED0-5E92-478F-A933-DE88C32D8D1A}" srcOrd="0" destOrd="0" presId="urn:microsoft.com/office/officeart/2005/8/layout/chevron2"/>
     <dgm:cxn modelId="{B12B66E2-8B76-4293-9C60-463397D24D35}" type="presOf" srcId="{7D0DC04B-C5AC-4E27-BDAC-6BF8F40D0BDE}" destId="{507CF799-E711-49F8-A10E-7F4E558229A3}" srcOrd="0" destOrd="0" presId="urn:microsoft.com/office/officeart/2005/8/layout/chevron2"/>
     <dgm:cxn modelId="{618B437A-9E0B-42AB-A9B6-FC2EEB3E8ED7}" srcId="{AEF0A3D8-84FA-4697-BC0A-8C6CF4A58B8F}" destId="{7D0DC04B-C5AC-4E27-BDAC-6BF8F40D0BDE}" srcOrd="0" destOrd="0" parTransId="{067B3EE3-F22F-481B-84B6-B655C3050066}" sibTransId="{8506B90A-D797-4533-9328-6AB471E3E91E}"/>
     <dgm:cxn modelId="{93B1205A-663C-4570-883C-C32EAB9D93ED}" srcId="{77EC20F4-BF3E-48EC-BBEB-7FFD1E0DE96E}" destId="{9FF5C2F6-268D-40A4-93A0-DCD6419064C4}" srcOrd="0" destOrd="0" parTransId="{FE516463-8527-4820-9B15-61D74591A5AB}" sibTransId="{5297EDC2-0F8E-4321-8002-5AE55D70602A}"/>
     <dgm:cxn modelId="{242FC7B9-BA39-4C00-90DF-60EE8AA3026F}" type="presOf" srcId="{9B01D21F-F69D-4C73-97C1-97E6B717A857}" destId="{A916A967-06DB-4288-9FA4-C581486762EA}" srcOrd="0" destOrd="1" presId="urn:microsoft.com/office/officeart/2005/8/layout/chevron2"/>
     <dgm:cxn modelId="{D8E8D815-2EE2-4179-AE48-9F06901954DF}" srcId="{77EC20F4-BF3E-48EC-BBEB-7FFD1E0DE96E}" destId="{9BAAD860-2243-4C38-937A-46A8310B4CBA}" srcOrd="1" destOrd="0" parTransId="{9D3BD548-3C9F-4B71-A11B-18C38EFA9998}" sibTransId="{1C03038A-B648-48C3-9CD8-22846FC7C39A}"/>
+    <dgm:cxn modelId="{64205A47-953D-47EF-8DF5-4D51FE0553F9}" type="presOf" srcId="{B0B2B549-CA1B-438D-83C4-44E9B2870F8B}" destId="{17627E75-CA30-41E0-BF67-18A0E413801B}" srcOrd="0" destOrd="0" presId="urn:microsoft.com/office/officeart/2005/8/layout/chevron2"/>
     <dgm:cxn modelId="{D3068C02-BF9F-4AA0-97FD-BC1B94EC6D88}" srcId="{77EC20F4-BF3E-48EC-BBEB-7FFD1E0DE96E}" destId="{AEF0A3D8-84FA-4697-BC0A-8C6CF4A58B8F}" srcOrd="2" destOrd="0" parTransId="{8026C325-1EB2-4CE7-A54B-916FFAE18CB5}" sibTransId="{9183FC39-2CEB-432C-97A6-3B777B94E3D9}"/>
-    <dgm:cxn modelId="{64205A47-953D-47EF-8DF5-4D51FE0553F9}" type="presOf" srcId="{B0B2B549-CA1B-438D-83C4-44E9B2870F8B}" destId="{17627E75-CA30-41E0-BF67-18A0E413801B}" srcOrd="0" destOrd="0" presId="urn:microsoft.com/office/officeart/2005/8/layout/chevron2"/>
     <dgm:cxn modelId="{AD703910-5CC2-495E-87DF-DE77DAACD456}" type="presOf" srcId="{9FF5C2F6-268D-40A4-93A0-DCD6419064C4}" destId="{FE618419-066B-495C-8BB5-7117E77BCB12}" srcOrd="0" destOrd="0" presId="urn:microsoft.com/office/officeart/2005/8/layout/chevron2"/>
     <dgm:cxn modelId="{358225EE-3862-42D3-981F-229EF42F59A4}" type="presParOf" srcId="{E3AE7ED0-5E92-478F-A933-DE88C32D8D1A}" destId="{5E4C8283-91A2-4670-96B8-6ABDCC6F2CEE}" srcOrd="0" destOrd="0" presId="urn:microsoft.com/office/officeart/2005/8/layout/chevron2"/>
     <dgm:cxn modelId="{7EED192C-EBF5-47C5-B358-77E265805A79}" type="presParOf" srcId="{5E4C8283-91A2-4670-96B8-6ABDCC6F2CEE}" destId="{FE618419-066B-495C-8BB5-7117E77BCB12}" srcOrd="0" destOrd="0" presId="urn:microsoft.com/office/officeart/2005/8/layout/chevron2"/>
@@ -6891,7 +7059,7 @@
   <dgm:whole/>
   <dgm:extLst>
     <a:ext uri="http://schemas.microsoft.com/office/drawing/2008/diagram">
-      <dsp:dataModelExt xmlns:dsp="http://schemas.microsoft.com/office/drawing/2008/diagram" relId="rId6" minVer="http://schemas.openxmlformats.org/drawingml/2006/diagram"/>
+      <dsp:dataModelExt xmlns:dsp="http://schemas.microsoft.com/office/drawing/2008/diagram" relId="rId7" minVer="http://schemas.openxmlformats.org/drawingml/2006/diagram"/>
     </a:ext>
   </dgm:extLst>
 </dgm:dataModel>
@@ -7413,6 +7581,13 @@
         </dgm:presLayoutVars>
       </dgm:prSet>
       <dgm:spPr/>
+      <dgm:t>
+        <a:bodyPr/>
+        <a:lstStyle/>
+        <a:p>
+          <a:endParaRPr lang="pt-PT"/>
+        </a:p>
+      </dgm:t>
     </dgm:pt>
     <dgm:pt modelId="{5E4C8283-91A2-4670-96B8-6ABDCC6F2CEE}" type="pres">
       <dgm:prSet presAssocID="{9FF5C2F6-268D-40A4-93A0-DCD6419064C4}" presName="composite" presStyleCnt="0"/>
@@ -7545,8 +7720,8 @@
     <dgm:cxn modelId="{93B1205A-663C-4570-883C-C32EAB9D93ED}" srcId="{77EC20F4-BF3E-48EC-BBEB-7FFD1E0DE96E}" destId="{9FF5C2F6-268D-40A4-93A0-DCD6419064C4}" srcOrd="0" destOrd="0" parTransId="{FE516463-8527-4820-9B15-61D74591A5AB}" sibTransId="{5297EDC2-0F8E-4321-8002-5AE55D70602A}"/>
     <dgm:cxn modelId="{242FC7B9-BA39-4C00-90DF-60EE8AA3026F}" type="presOf" srcId="{9B01D21F-F69D-4C73-97C1-97E6B717A857}" destId="{A916A967-06DB-4288-9FA4-C581486762EA}" srcOrd="0" destOrd="1" presId="urn:microsoft.com/office/officeart/2005/8/layout/chevron2"/>
     <dgm:cxn modelId="{D8E8D815-2EE2-4179-AE48-9F06901954DF}" srcId="{77EC20F4-BF3E-48EC-BBEB-7FFD1E0DE96E}" destId="{9BAAD860-2243-4C38-937A-46A8310B4CBA}" srcOrd="1" destOrd="0" parTransId="{9D3BD548-3C9F-4B71-A11B-18C38EFA9998}" sibTransId="{1C03038A-B648-48C3-9CD8-22846FC7C39A}"/>
+    <dgm:cxn modelId="{D3068C02-BF9F-4AA0-97FD-BC1B94EC6D88}" srcId="{77EC20F4-BF3E-48EC-BBEB-7FFD1E0DE96E}" destId="{AEF0A3D8-84FA-4697-BC0A-8C6CF4A58B8F}" srcOrd="2" destOrd="0" parTransId="{8026C325-1EB2-4CE7-A54B-916FFAE18CB5}" sibTransId="{9183FC39-2CEB-432C-97A6-3B777B94E3D9}"/>
     <dgm:cxn modelId="{64205A47-953D-47EF-8DF5-4D51FE0553F9}" type="presOf" srcId="{B0B2B549-CA1B-438D-83C4-44E9B2870F8B}" destId="{17627E75-CA30-41E0-BF67-18A0E413801B}" srcOrd="0" destOrd="0" presId="urn:microsoft.com/office/officeart/2005/8/layout/chevron2"/>
-    <dgm:cxn modelId="{D3068C02-BF9F-4AA0-97FD-BC1B94EC6D88}" srcId="{77EC20F4-BF3E-48EC-BBEB-7FFD1E0DE96E}" destId="{AEF0A3D8-84FA-4697-BC0A-8C6CF4A58B8F}" srcOrd="2" destOrd="0" parTransId="{8026C325-1EB2-4CE7-A54B-916FFAE18CB5}" sibTransId="{9183FC39-2CEB-432C-97A6-3B777B94E3D9}"/>
     <dgm:cxn modelId="{AD703910-5CC2-495E-87DF-DE77DAACD456}" type="presOf" srcId="{9FF5C2F6-268D-40A4-93A0-DCD6419064C4}" destId="{FE618419-066B-495C-8BB5-7117E77BCB12}" srcOrd="0" destOrd="0" presId="urn:microsoft.com/office/officeart/2005/8/layout/chevron2"/>
     <dgm:cxn modelId="{358225EE-3862-42D3-981F-229EF42F59A4}" type="presParOf" srcId="{E3AE7ED0-5E92-478F-A933-DE88C32D8D1A}" destId="{5E4C8283-91A2-4670-96B8-6ABDCC6F2CEE}" srcOrd="0" destOrd="0" presId="urn:microsoft.com/office/officeart/2005/8/layout/chevron2"/>
     <dgm:cxn modelId="{7EED192C-EBF5-47C5-B358-77E265805A79}" type="presParOf" srcId="{5E4C8283-91A2-4670-96B8-6ABDCC6F2CEE}" destId="{FE618419-066B-495C-8BB5-7117E77BCB12}" srcOrd="0" destOrd="0" presId="urn:microsoft.com/office/officeart/2005/8/layout/chevron2"/>
@@ -7564,7 +7739,7 @@
   <dgm:whole/>
   <dgm:extLst>
     <a:ext uri="http://schemas.microsoft.com/office/drawing/2008/diagram">
-      <dsp:dataModelExt xmlns:dsp="http://schemas.microsoft.com/office/drawing/2008/diagram" relId="rId6" minVer="http://schemas.openxmlformats.org/drawingml/2006/diagram"/>
+      <dsp:dataModelExt xmlns:dsp="http://schemas.microsoft.com/office/drawing/2008/diagram" relId="rId7" minVer="http://schemas.openxmlformats.org/drawingml/2006/diagram"/>
     </a:ext>
   </dgm:extLst>
 </dgm:dataModel>
@@ -8094,6 +8269,13 @@
         </dgm:presLayoutVars>
       </dgm:prSet>
       <dgm:spPr/>
+      <dgm:t>
+        <a:bodyPr/>
+        <a:lstStyle/>
+        <a:p>
+          <a:endParaRPr lang="pt-PT"/>
+        </a:p>
+      </dgm:t>
     </dgm:pt>
     <dgm:pt modelId="{5E4C8283-91A2-4670-96B8-6ABDCC6F2CEE}" type="pres">
       <dgm:prSet presAssocID="{9FF5C2F6-268D-40A4-93A0-DCD6419064C4}" presName="composite" presStyleCnt="0"/>
@@ -8226,8 +8408,8 @@
     <dgm:cxn modelId="{93B1205A-663C-4570-883C-C32EAB9D93ED}" srcId="{77EC20F4-BF3E-48EC-BBEB-7FFD1E0DE96E}" destId="{9FF5C2F6-268D-40A4-93A0-DCD6419064C4}" srcOrd="0" destOrd="0" parTransId="{FE516463-8527-4820-9B15-61D74591A5AB}" sibTransId="{5297EDC2-0F8E-4321-8002-5AE55D70602A}"/>
     <dgm:cxn modelId="{242FC7B9-BA39-4C00-90DF-60EE8AA3026F}" type="presOf" srcId="{9B01D21F-F69D-4C73-97C1-97E6B717A857}" destId="{A916A967-06DB-4288-9FA4-C581486762EA}" srcOrd="0" destOrd="1" presId="urn:microsoft.com/office/officeart/2005/8/layout/chevron2"/>
     <dgm:cxn modelId="{D8E8D815-2EE2-4179-AE48-9F06901954DF}" srcId="{77EC20F4-BF3E-48EC-BBEB-7FFD1E0DE96E}" destId="{9BAAD860-2243-4C38-937A-46A8310B4CBA}" srcOrd="1" destOrd="0" parTransId="{9D3BD548-3C9F-4B71-A11B-18C38EFA9998}" sibTransId="{1C03038A-B648-48C3-9CD8-22846FC7C39A}"/>
+    <dgm:cxn modelId="{64205A47-953D-47EF-8DF5-4D51FE0553F9}" type="presOf" srcId="{B0B2B549-CA1B-438D-83C4-44E9B2870F8B}" destId="{17627E75-CA30-41E0-BF67-18A0E413801B}" srcOrd="0" destOrd="0" presId="urn:microsoft.com/office/officeart/2005/8/layout/chevron2"/>
     <dgm:cxn modelId="{D3068C02-BF9F-4AA0-97FD-BC1B94EC6D88}" srcId="{77EC20F4-BF3E-48EC-BBEB-7FFD1E0DE96E}" destId="{AEF0A3D8-84FA-4697-BC0A-8C6CF4A58B8F}" srcOrd="2" destOrd="0" parTransId="{8026C325-1EB2-4CE7-A54B-916FFAE18CB5}" sibTransId="{9183FC39-2CEB-432C-97A6-3B777B94E3D9}"/>
-    <dgm:cxn modelId="{64205A47-953D-47EF-8DF5-4D51FE0553F9}" type="presOf" srcId="{B0B2B549-CA1B-438D-83C4-44E9B2870F8B}" destId="{17627E75-CA30-41E0-BF67-18A0E413801B}" srcOrd="0" destOrd="0" presId="urn:microsoft.com/office/officeart/2005/8/layout/chevron2"/>
     <dgm:cxn modelId="{AD703910-5CC2-495E-87DF-DE77DAACD456}" type="presOf" srcId="{9FF5C2F6-268D-40A4-93A0-DCD6419064C4}" destId="{FE618419-066B-495C-8BB5-7117E77BCB12}" srcOrd="0" destOrd="0" presId="urn:microsoft.com/office/officeart/2005/8/layout/chevron2"/>
     <dgm:cxn modelId="{358225EE-3862-42D3-981F-229EF42F59A4}" type="presParOf" srcId="{E3AE7ED0-5E92-478F-A933-DE88C32D8D1A}" destId="{5E4C8283-91A2-4670-96B8-6ABDCC6F2CEE}" srcOrd="0" destOrd="0" presId="urn:microsoft.com/office/officeart/2005/8/layout/chevron2"/>
     <dgm:cxn modelId="{7EED192C-EBF5-47C5-B358-77E265805A79}" type="presParOf" srcId="{5E4C8283-91A2-4670-96B8-6ABDCC6F2CEE}" destId="{FE618419-066B-495C-8BB5-7117E77BCB12}" srcOrd="0" destOrd="0" presId="urn:microsoft.com/office/officeart/2005/8/layout/chevron2"/>
@@ -8245,7 +8427,7 @@
   <dgm:whole/>
   <dgm:extLst>
     <a:ext uri="http://schemas.microsoft.com/office/drawing/2008/diagram">
-      <dsp:dataModelExt xmlns:dsp="http://schemas.microsoft.com/office/drawing/2008/diagram" relId="rId6" minVer="http://schemas.openxmlformats.org/drawingml/2006/diagram"/>
+      <dsp:dataModelExt xmlns:dsp="http://schemas.microsoft.com/office/drawing/2008/diagram" relId="rId7" minVer="http://schemas.openxmlformats.org/drawingml/2006/diagram"/>
     </a:ext>
   </dgm:extLst>
 </dgm:dataModel>
@@ -22764,7 +22946,7 @@
           <a:p>
             <a:fld id="{D53CEB6E-A33F-4E49-B64C-131A700B84D4}" type="slidenum">
               <a:rPr lang="pt-PT" smtClean="0"/>
-              <a:t>‹#›</a:t>
+              <a:t>‹nº›</a:t>
             </a:fld>
             <a:endParaRPr lang="pt-PT"/>
           </a:p>
@@ -22874,6 +23056,945 @@
 </file>
 
 <file path=ppt/notesSlides/notesSlide1.xml><?xml version="1.0" encoding="utf-8"?>
+<p:notes xmlns:a="http://schemas.openxmlformats.org/drawingml/2006/main" xmlns:r="http://schemas.openxmlformats.org/officeDocument/2006/relationships" xmlns:p="http://schemas.openxmlformats.org/presentationml/2006/main">
+  <p:cSld>
+    <p:spTree>
+      <p:nvGrpSpPr>
+        <p:cNvPr id="1" name=""/>
+        <p:cNvGrpSpPr/>
+        <p:nvPr/>
+      </p:nvGrpSpPr>
+      <p:grpSpPr>
+        <a:xfrm>
+          <a:off x="0" y="0"/>
+          <a:ext cx="0" cy="0"/>
+          <a:chOff x="0" y="0"/>
+          <a:chExt cx="0" cy="0"/>
+        </a:xfrm>
+      </p:grpSpPr>
+      <p:sp>
+        <p:nvSpPr>
+          <p:cNvPr id="2" name="Marcador de Posição da Imagem do Diapositivo 1"/>
+          <p:cNvSpPr>
+            <a:spLocks noGrp="1" noRot="1" noChangeAspect="1"/>
+          </p:cNvSpPr>
+          <p:nvPr>
+            <p:ph type="sldImg"/>
+          </p:nvPr>
+        </p:nvSpPr>
+        <p:spPr/>
+      </p:sp>
+      <p:sp>
+        <p:nvSpPr>
+          <p:cNvPr id="3" name="Marcador de Posição de Notas 2"/>
+          <p:cNvSpPr>
+            <a:spLocks noGrp="1"/>
+          </p:cNvSpPr>
+          <p:nvPr>
+            <p:ph type="body" idx="1"/>
+          </p:nvPr>
+        </p:nvSpPr>
+        <p:spPr/>
+        <p:txBody>
+          <a:bodyPr/>
+          <a:lstStyle/>
+          <a:p>
+            <a:r>
+              <a:rPr lang="en-US" sz="1200" b="0" i="0" kern="1200" dirty="0" smtClean="0">
+                <a:solidFill>
+                  <a:schemeClr val="tx1"/>
+                </a:solidFill>
+                <a:effectLst/>
+                <a:latin typeface="+mn-lt"/>
+                <a:ea typeface="+mn-ea"/>
+                <a:cs typeface="+mn-cs"/>
+              </a:rPr>
+              <a:t>Most of the botnets detected until today are somehow related to sending </a:t>
+            </a:r>
+            <a:r>
+              <a:rPr lang="en-US" sz="1200" b="0" i="0" kern="1200" dirty="0" err="1" smtClean="0">
+                <a:solidFill>
+                  <a:schemeClr val="tx1"/>
+                </a:solidFill>
+                <a:effectLst/>
+                <a:latin typeface="+mn-lt"/>
+                <a:ea typeface="+mn-ea"/>
+                <a:cs typeface="+mn-cs"/>
+              </a:rPr>
+              <a:t>enourmous</a:t>
+            </a:r>
+            <a:r>
+              <a:rPr lang="en-US" sz="1200" b="0" i="0" kern="1200" dirty="0" smtClean="0">
+                <a:solidFill>
+                  <a:schemeClr val="tx1"/>
+                </a:solidFill>
+                <a:effectLst/>
+                <a:latin typeface="+mn-lt"/>
+                <a:ea typeface="+mn-ea"/>
+                <a:cs typeface="+mn-cs"/>
+              </a:rPr>
+              <a:t> amounts of e-mails, especially spam.</a:t>
+            </a:r>
+          </a:p>
+          <a:p>
+            <a:r>
+              <a:rPr lang="en-US" sz="1200" b="0" i="0" kern="1200" dirty="0" smtClean="0">
+                <a:solidFill>
+                  <a:schemeClr val="tx1"/>
+                </a:solidFill>
+                <a:effectLst/>
+                <a:latin typeface="+mn-lt"/>
+                <a:ea typeface="+mn-ea"/>
+                <a:cs typeface="+mn-cs"/>
+              </a:rPr>
+              <a:t>Be aware that the estimated number of bots presented below are just that because in some countries it is common that users change their IP address several times a day.</a:t>
+            </a:r>
+            <a:endParaRPr lang="en-US" sz="1200" b="1" i="0" kern="1200" dirty="0" smtClean="0">
+              <a:solidFill>
+                <a:schemeClr val="tx1"/>
+              </a:solidFill>
+              <a:effectLst/>
+              <a:latin typeface="+mn-lt"/>
+              <a:ea typeface="+mn-ea"/>
+              <a:cs typeface="+mn-cs"/>
+            </a:endParaRPr>
+          </a:p>
+          <a:p>
+            <a:endParaRPr lang="en-US" sz="1200" b="1" i="0" kern="1200" dirty="0" smtClean="0">
+              <a:solidFill>
+                <a:schemeClr val="tx1"/>
+              </a:solidFill>
+              <a:effectLst/>
+              <a:latin typeface="+mn-lt"/>
+              <a:ea typeface="+mn-ea"/>
+              <a:cs typeface="+mn-cs"/>
+            </a:endParaRPr>
+          </a:p>
+          <a:p>
+            <a:r>
+              <a:rPr lang="en-US" sz="1200" b="1" i="0" kern="1200" dirty="0" err="1" smtClean="0">
+                <a:solidFill>
+                  <a:schemeClr val="tx1"/>
+                </a:solidFill>
+                <a:effectLst/>
+                <a:latin typeface="+mn-lt"/>
+                <a:ea typeface="+mn-ea"/>
+                <a:cs typeface="+mn-cs"/>
+              </a:rPr>
+              <a:t>Bagle</a:t>
+            </a:r>
+            <a:r>
+              <a:rPr lang="en-US" sz="1200" b="0" i="0" kern="1200" baseline="0" dirty="0" smtClean="0">
+                <a:solidFill>
+                  <a:schemeClr val="tx1"/>
+                </a:solidFill>
+                <a:effectLst/>
+                <a:latin typeface="+mn-lt"/>
+                <a:ea typeface="+mn-ea"/>
+                <a:cs typeface="+mn-cs"/>
+              </a:rPr>
+              <a:t> </a:t>
+            </a:r>
+            <a:r>
+              <a:rPr lang="en-US" sz="1200" b="0" i="0" kern="1200" dirty="0" smtClean="0">
+                <a:solidFill>
+                  <a:schemeClr val="tx1"/>
+                </a:solidFill>
+                <a:effectLst/>
+                <a:latin typeface="+mn-lt"/>
+                <a:ea typeface="+mn-ea"/>
+                <a:cs typeface="+mn-cs"/>
+              </a:rPr>
+              <a:t>Est. no of bots: 230 000; Uses its own SMTP engine to mass-mail itself as an attachment to recipients. </a:t>
+            </a:r>
+          </a:p>
+          <a:p>
+            <a:r>
+              <a:rPr lang="en-US" sz="1200" b="1" i="0" kern="1200" dirty="0" err="1" smtClean="0">
+                <a:solidFill>
+                  <a:schemeClr val="tx1"/>
+                </a:solidFill>
+                <a:effectLst/>
+                <a:latin typeface="+mn-lt"/>
+                <a:ea typeface="+mn-ea"/>
+                <a:cs typeface="+mn-cs"/>
+              </a:rPr>
+              <a:t>Rustock</a:t>
+            </a:r>
+            <a:r>
+              <a:rPr lang="en-US" sz="1200" b="0" i="0" kern="1200" dirty="0" smtClean="0">
+                <a:solidFill>
+                  <a:schemeClr val="tx1"/>
+                </a:solidFill>
+                <a:effectLst/>
+                <a:latin typeface="+mn-lt"/>
+                <a:ea typeface="+mn-ea"/>
+                <a:cs typeface="+mn-cs"/>
+              </a:rPr>
+              <a:t> Est. no of bots: 150 000; It</a:t>
+            </a:r>
+            <a:r>
+              <a:rPr lang="en-US" sz="1200" b="0" i="0" kern="1200" baseline="0" dirty="0" smtClean="0">
+                <a:solidFill>
+                  <a:schemeClr val="tx1"/>
+                </a:solidFill>
+                <a:effectLst/>
+                <a:latin typeface="+mn-lt"/>
+                <a:ea typeface="+mn-ea"/>
+                <a:cs typeface="+mn-cs"/>
+              </a:rPr>
+              <a:t> </a:t>
+            </a:r>
+            <a:r>
+              <a:rPr lang="en-US" sz="1200" b="0" i="0" kern="1200" dirty="0" smtClean="0">
+                <a:solidFill>
+                  <a:schemeClr val="tx1"/>
+                </a:solidFill>
+                <a:effectLst/>
+                <a:latin typeface="+mn-lt"/>
+                <a:ea typeface="+mn-ea"/>
+                <a:cs typeface="+mn-cs"/>
+              </a:rPr>
+              <a:t>uses self-propagation by sending malicious e-mails with a </a:t>
+            </a:r>
+            <a:r>
+              <a:rPr lang="en-US" sz="1200" b="0" i="0" kern="1200" dirty="0" err="1" smtClean="0">
+                <a:solidFill>
+                  <a:schemeClr val="tx1"/>
+                </a:solidFill>
+                <a:effectLst/>
+                <a:latin typeface="+mn-lt"/>
+                <a:ea typeface="+mn-ea"/>
+                <a:cs typeface="+mn-cs"/>
+              </a:rPr>
+              <a:t>trojan</a:t>
+            </a:r>
+            <a:r>
+              <a:rPr lang="en-US" sz="1200" b="0" i="0" kern="1200" dirty="0" smtClean="0">
+                <a:solidFill>
+                  <a:schemeClr val="tx1"/>
+                </a:solidFill>
+                <a:effectLst/>
+                <a:latin typeface="+mn-lt"/>
+                <a:ea typeface="+mn-ea"/>
+                <a:cs typeface="+mn-cs"/>
+              </a:rPr>
+              <a:t> incorporating the targeted machine into the botnet.</a:t>
+            </a:r>
+          </a:p>
+          <a:p>
+            <a:pPr marL="0" marR="0" indent="0" algn="l" defTabSz="914400" rtl="0" eaLnBrk="1" fontAlgn="auto" latinLnBrk="0" hangingPunct="1">
+              <a:lnSpc>
+                <a:spcPct val="100000"/>
+              </a:lnSpc>
+              <a:spcBef>
+                <a:spcPts val="0"/>
+              </a:spcBef>
+              <a:spcAft>
+                <a:spcPts val="0"/>
+              </a:spcAft>
+              <a:buClrTx/>
+              <a:buSzTx/>
+              <a:buFontTx/>
+              <a:buNone/>
+              <a:tabLst/>
+              <a:defRPr/>
+            </a:pPr>
+            <a:r>
+              <a:rPr lang="en-US" sz="1200" b="1" i="0" kern="1200" dirty="0" err="1" smtClean="0">
+                <a:solidFill>
+                  <a:schemeClr val="tx1"/>
+                </a:solidFill>
+                <a:effectLst/>
+                <a:latin typeface="+mn-lt"/>
+                <a:ea typeface="+mn-ea"/>
+                <a:cs typeface="+mn-cs"/>
+              </a:rPr>
+              <a:t>Akbot</a:t>
+            </a:r>
+            <a:r>
+              <a:rPr lang="en-US" sz="1200" b="1" i="0" kern="1200" dirty="0" smtClean="0">
+                <a:solidFill>
+                  <a:schemeClr val="tx1"/>
+                </a:solidFill>
+                <a:effectLst/>
+                <a:latin typeface="+mn-lt"/>
+                <a:ea typeface="+mn-ea"/>
+                <a:cs typeface="+mn-cs"/>
+              </a:rPr>
+              <a:t> (2007)</a:t>
+            </a:r>
+            <a:r>
+              <a:rPr lang="en-US" sz="1200" b="0" i="0" kern="1200" dirty="0" smtClean="0">
+                <a:solidFill>
+                  <a:schemeClr val="tx1"/>
+                </a:solidFill>
+                <a:effectLst/>
+                <a:latin typeface="+mn-lt"/>
+                <a:ea typeface="+mn-ea"/>
+                <a:cs typeface="+mn-cs"/>
+              </a:rPr>
+              <a:t> Est. no of bots: 1 300 000; It operates by joining IRC servers and then waiting for further instructions. Once installed, </a:t>
+            </a:r>
+            <a:r>
+              <a:rPr lang="en-US" sz="1200" b="0" i="0" kern="1200" dirty="0" err="1" smtClean="0">
+                <a:solidFill>
+                  <a:schemeClr val="tx1"/>
+                </a:solidFill>
+                <a:effectLst/>
+                <a:latin typeface="+mn-lt"/>
+                <a:ea typeface="+mn-ea"/>
+                <a:cs typeface="+mn-cs"/>
+              </a:rPr>
+              <a:t>Akbot</a:t>
+            </a:r>
+            <a:r>
+              <a:rPr lang="en-US" sz="1200" b="0" i="0" kern="1200" dirty="0" smtClean="0">
+                <a:solidFill>
+                  <a:schemeClr val="tx1"/>
+                </a:solidFill>
+                <a:effectLst/>
+                <a:latin typeface="+mn-lt"/>
+                <a:ea typeface="+mn-ea"/>
+                <a:cs typeface="+mn-cs"/>
+              </a:rPr>
+              <a:t> can be used to gather data, kill processes, or perform DDOS attacks.</a:t>
+            </a:r>
+          </a:p>
+          <a:p>
+            <a:r>
+              <a:rPr lang="en-US" sz="1200" b="1" i="0" kern="1200" dirty="0" err="1" smtClean="0">
+                <a:solidFill>
+                  <a:schemeClr val="tx1"/>
+                </a:solidFill>
+                <a:effectLst/>
+                <a:latin typeface="+mn-lt"/>
+                <a:ea typeface="+mn-ea"/>
+                <a:cs typeface="+mn-cs"/>
+              </a:rPr>
+              <a:t>Cutwail</a:t>
+            </a:r>
+            <a:r>
+              <a:rPr lang="en-US" sz="1200" b="0" i="0" kern="1200" dirty="0" smtClean="0">
+                <a:solidFill>
+                  <a:schemeClr val="tx1"/>
+                </a:solidFill>
+                <a:effectLst/>
+                <a:latin typeface="+mn-lt"/>
+                <a:ea typeface="+mn-ea"/>
+                <a:cs typeface="+mn-cs"/>
+              </a:rPr>
+              <a:t> Est. no of bots: 1 500 000; It uses a Trojan component called </a:t>
+            </a:r>
+            <a:r>
+              <a:rPr lang="en-US" sz="1200" b="0" i="0" kern="1200" dirty="0" err="1" smtClean="0">
+                <a:solidFill>
+                  <a:schemeClr val="tx1"/>
+                </a:solidFill>
+                <a:effectLst/>
+                <a:latin typeface="+mn-lt"/>
+                <a:ea typeface="+mn-ea"/>
+                <a:cs typeface="+mn-cs"/>
+              </a:rPr>
+              <a:t>Pushdo</a:t>
+            </a:r>
+            <a:r>
+              <a:rPr lang="en-US" sz="1200" b="0" i="0" kern="1200" dirty="0" smtClean="0">
+                <a:solidFill>
+                  <a:schemeClr val="tx1"/>
+                </a:solidFill>
+                <a:effectLst/>
+                <a:latin typeface="+mn-lt"/>
+                <a:ea typeface="+mn-ea"/>
+                <a:cs typeface="+mn-cs"/>
+              </a:rPr>
+              <a:t> to infect a machine.</a:t>
+            </a:r>
+          </a:p>
+          <a:p>
+            <a:endParaRPr lang="en-US" sz="1200" b="0" i="0" kern="1200" dirty="0" smtClean="0">
+              <a:solidFill>
+                <a:schemeClr val="tx1"/>
+              </a:solidFill>
+              <a:effectLst/>
+              <a:latin typeface="+mn-lt"/>
+              <a:ea typeface="+mn-ea"/>
+              <a:cs typeface="+mn-cs"/>
+            </a:endParaRPr>
+          </a:p>
+          <a:p>
+            <a:endParaRPr lang="en-US" sz="1200" b="0" i="0" kern="1200" dirty="0" smtClean="0">
+              <a:solidFill>
+                <a:schemeClr val="tx1"/>
+              </a:solidFill>
+              <a:effectLst/>
+              <a:latin typeface="+mn-lt"/>
+              <a:ea typeface="+mn-ea"/>
+              <a:cs typeface="+mn-cs"/>
+            </a:endParaRPr>
+          </a:p>
+        </p:txBody>
+      </p:sp>
+      <p:sp>
+        <p:nvSpPr>
+          <p:cNvPr id="4" name="Marcador de Posição do Número do Diapositivo 3"/>
+          <p:cNvSpPr>
+            <a:spLocks noGrp="1"/>
+          </p:cNvSpPr>
+          <p:nvPr>
+            <p:ph type="sldNum" sz="quarter" idx="10"/>
+          </p:nvPr>
+        </p:nvSpPr>
+        <p:spPr/>
+        <p:txBody>
+          <a:bodyPr/>
+          <a:lstStyle/>
+          <a:p>
+            <a:fld id="{D53CEB6E-A33F-4E49-B64C-131A700B84D4}" type="slidenum">
+              <a:rPr lang="pt-PT" smtClean="0"/>
+              <a:t>9</a:t>
+            </a:fld>
+            <a:endParaRPr lang="pt-PT"/>
+          </a:p>
+        </p:txBody>
+      </p:sp>
+    </p:spTree>
+    <p:extLst>
+      <p:ext uri="{BB962C8B-B14F-4D97-AF65-F5344CB8AC3E}">
+        <p14:creationId xmlns:p14="http://schemas.microsoft.com/office/powerpoint/2010/main" val="3546152420"/>
+      </p:ext>
+    </p:extLst>
+  </p:cSld>
+  <p:clrMapOvr>
+    <a:masterClrMapping/>
+  </p:clrMapOvr>
+</p:notes>
+</file>
+
+<file path=ppt/notesSlides/notesSlide2.xml><?xml version="1.0" encoding="utf-8"?>
+<p:notes xmlns:a="http://schemas.openxmlformats.org/drawingml/2006/main" xmlns:r="http://schemas.openxmlformats.org/officeDocument/2006/relationships" xmlns:p="http://schemas.openxmlformats.org/presentationml/2006/main">
+  <p:cSld>
+    <p:spTree>
+      <p:nvGrpSpPr>
+        <p:cNvPr id="1" name=""/>
+        <p:cNvGrpSpPr/>
+        <p:nvPr/>
+      </p:nvGrpSpPr>
+      <p:grpSpPr>
+        <a:xfrm>
+          <a:off x="0" y="0"/>
+          <a:ext cx="0" cy="0"/>
+          <a:chOff x="0" y="0"/>
+          <a:chExt cx="0" cy="0"/>
+        </a:xfrm>
+      </p:grpSpPr>
+      <p:sp>
+        <p:nvSpPr>
+          <p:cNvPr id="2" name="Marcador de Posição da Imagem do Diapositivo 1"/>
+          <p:cNvSpPr>
+            <a:spLocks noGrp="1" noRot="1" noChangeAspect="1"/>
+          </p:cNvSpPr>
+          <p:nvPr>
+            <p:ph type="sldImg"/>
+          </p:nvPr>
+        </p:nvSpPr>
+        <p:spPr/>
+      </p:sp>
+      <p:sp>
+        <p:nvSpPr>
+          <p:cNvPr id="3" name="Marcador de Posição de Notas 2"/>
+          <p:cNvSpPr>
+            <a:spLocks noGrp="1"/>
+          </p:cNvSpPr>
+          <p:nvPr>
+            <p:ph type="body" idx="1"/>
+          </p:nvPr>
+        </p:nvSpPr>
+        <p:spPr/>
+        <p:txBody>
+          <a:bodyPr/>
+          <a:lstStyle/>
+          <a:p>
+            <a:r>
+              <a:rPr lang="en-US" sz="1200" b="1" i="0" kern="1200" dirty="0" err="1" smtClean="0">
+                <a:solidFill>
+                  <a:schemeClr val="tx1"/>
+                </a:solidFill>
+                <a:effectLst/>
+                <a:latin typeface="+mn-lt"/>
+                <a:ea typeface="+mn-ea"/>
+                <a:cs typeface="+mn-cs"/>
+              </a:rPr>
+              <a:t>Conficker</a:t>
+            </a:r>
+            <a:r>
+              <a:rPr lang="en-US" sz="1200" b="0" i="0" kern="1200" dirty="0" smtClean="0">
+                <a:solidFill>
+                  <a:schemeClr val="tx1"/>
+                </a:solidFill>
+                <a:effectLst/>
+                <a:latin typeface="+mn-lt"/>
+                <a:ea typeface="+mn-ea"/>
+                <a:cs typeface="+mn-cs"/>
+              </a:rPr>
+              <a:t> Est. no of bots: 10 500 000+; The botnet uses flaws in Windows OS software and dictionary attacks on administrator passwords to propagate itself.</a:t>
+            </a:r>
+          </a:p>
+          <a:p>
+            <a:r>
+              <a:rPr lang="en-US" sz="1200" b="1" i="0" kern="1200" dirty="0" err="1" smtClean="0">
+                <a:solidFill>
+                  <a:schemeClr val="tx1"/>
+                </a:solidFill>
+                <a:effectLst/>
+                <a:latin typeface="+mn-lt"/>
+                <a:ea typeface="+mn-ea"/>
+                <a:cs typeface="+mn-cs"/>
+              </a:rPr>
+              <a:t>BredoLab</a:t>
+            </a:r>
+            <a:r>
+              <a:rPr lang="en-US" sz="1200" b="0" i="0" kern="1200" dirty="0" smtClean="0">
+                <a:solidFill>
+                  <a:schemeClr val="tx1"/>
+                </a:solidFill>
+                <a:effectLst/>
+                <a:latin typeface="+mn-lt"/>
+                <a:ea typeface="+mn-ea"/>
+                <a:cs typeface="+mn-cs"/>
+              </a:rPr>
+              <a:t> Est. no of bots: 30 000 000; “A district court sentenced 27-year-old Georgy </a:t>
+            </a:r>
+            <a:r>
+              <a:rPr lang="en-US" sz="1200" b="0" i="0" kern="1200" dirty="0" err="1" smtClean="0">
+                <a:solidFill>
+                  <a:schemeClr val="tx1"/>
+                </a:solidFill>
+                <a:effectLst/>
+                <a:latin typeface="+mn-lt"/>
+                <a:ea typeface="+mn-ea"/>
+                <a:cs typeface="+mn-cs"/>
+              </a:rPr>
+              <a:t>Avanesov</a:t>
+            </a:r>
+            <a:r>
+              <a:rPr lang="en-US" sz="1200" b="0" i="0" kern="1200" dirty="0" smtClean="0">
+                <a:solidFill>
+                  <a:schemeClr val="tx1"/>
+                </a:solidFill>
+                <a:effectLst/>
+                <a:latin typeface="+mn-lt"/>
+                <a:ea typeface="+mn-ea"/>
+                <a:cs typeface="+mn-cs"/>
+              </a:rPr>
+              <a:t>, a Russian citizen of Armenian descent, to four years in prison on charges of creating and spreading the </a:t>
+            </a:r>
+            <a:r>
+              <a:rPr lang="en-US" sz="1200" b="0" i="0" kern="1200" dirty="0" err="1" smtClean="0">
+                <a:solidFill>
+                  <a:schemeClr val="tx1"/>
+                </a:solidFill>
+                <a:effectLst/>
+                <a:latin typeface="+mn-lt"/>
+                <a:ea typeface="+mn-ea"/>
+                <a:cs typeface="+mn-cs"/>
+              </a:rPr>
+              <a:t>Bredolab</a:t>
+            </a:r>
+            <a:r>
+              <a:rPr lang="en-US" sz="1200" b="0" i="0" kern="1200" dirty="0" smtClean="0">
+                <a:solidFill>
+                  <a:schemeClr val="tx1"/>
+                </a:solidFill>
+                <a:effectLst/>
+                <a:latin typeface="+mn-lt"/>
+                <a:ea typeface="+mn-ea"/>
+                <a:cs typeface="+mn-cs"/>
+              </a:rPr>
+              <a:t> virus”.</a:t>
+            </a:r>
+          </a:p>
+          <a:p>
+            <a:r>
+              <a:rPr lang="en-US" sz="1200" b="1" i="0" kern="1200" dirty="0" smtClean="0">
+                <a:solidFill>
+                  <a:schemeClr val="tx1"/>
+                </a:solidFill>
+                <a:effectLst/>
+                <a:latin typeface="+mn-lt"/>
+                <a:ea typeface="+mn-ea"/>
+                <a:cs typeface="+mn-cs"/>
+              </a:rPr>
+              <a:t>TDL-4</a:t>
+            </a:r>
+            <a:r>
+              <a:rPr lang="en-US" sz="1200" b="0" i="0" kern="1200" dirty="0" smtClean="0">
+                <a:solidFill>
+                  <a:schemeClr val="tx1"/>
+                </a:solidFill>
+                <a:effectLst/>
+                <a:latin typeface="+mn-lt"/>
+                <a:ea typeface="+mn-ea"/>
+                <a:cs typeface="+mn-cs"/>
+              </a:rPr>
+              <a:t> Est. no of bots: 4 500 000+;</a:t>
+            </a:r>
+            <a:r>
+              <a:rPr lang="en-US" sz="1200" b="0" i="0" kern="1200" baseline="0" dirty="0" smtClean="0">
+                <a:solidFill>
+                  <a:schemeClr val="tx1"/>
+                </a:solidFill>
+                <a:effectLst/>
+                <a:latin typeface="+mn-lt"/>
+                <a:ea typeface="+mn-ea"/>
+                <a:cs typeface="+mn-cs"/>
+              </a:rPr>
+              <a:t> </a:t>
+            </a:r>
+            <a:r>
+              <a:rPr lang="en-US" sz="1200" b="0" i="0" kern="1200" dirty="0" smtClean="0">
+                <a:solidFill>
+                  <a:schemeClr val="tx1"/>
+                </a:solidFill>
+                <a:effectLst/>
+                <a:latin typeface="+mn-lt"/>
+                <a:ea typeface="+mn-ea"/>
+                <a:cs typeface="+mn-cs"/>
+              </a:rPr>
+              <a:t>It infects the master boot record of the target machine, making it harder to detect and remove.</a:t>
+            </a:r>
+          </a:p>
+          <a:p>
+            <a:endParaRPr lang="en-US" sz="1200" b="0" i="0" kern="1200" dirty="0" smtClean="0">
+              <a:solidFill>
+                <a:schemeClr val="tx1"/>
+              </a:solidFill>
+              <a:effectLst/>
+              <a:latin typeface="+mn-lt"/>
+              <a:ea typeface="+mn-ea"/>
+              <a:cs typeface="+mn-cs"/>
+            </a:endParaRPr>
+          </a:p>
+          <a:p>
+            <a:endParaRPr lang="pt-PT" dirty="0"/>
+          </a:p>
+        </p:txBody>
+      </p:sp>
+      <p:sp>
+        <p:nvSpPr>
+          <p:cNvPr id="4" name="Marcador de Posição do Número do Diapositivo 3"/>
+          <p:cNvSpPr>
+            <a:spLocks noGrp="1"/>
+          </p:cNvSpPr>
+          <p:nvPr>
+            <p:ph type="sldNum" sz="quarter" idx="10"/>
+          </p:nvPr>
+        </p:nvSpPr>
+        <p:spPr/>
+        <p:txBody>
+          <a:bodyPr/>
+          <a:lstStyle/>
+          <a:p>
+            <a:fld id="{D53CEB6E-A33F-4E49-B64C-131A700B84D4}" type="slidenum">
+              <a:rPr lang="pt-PT" smtClean="0"/>
+              <a:t>10</a:t>
+            </a:fld>
+            <a:endParaRPr lang="pt-PT"/>
+          </a:p>
+        </p:txBody>
+      </p:sp>
+    </p:spTree>
+    <p:extLst>
+      <p:ext uri="{BB962C8B-B14F-4D97-AF65-F5344CB8AC3E}">
+        <p14:creationId xmlns:p14="http://schemas.microsoft.com/office/powerpoint/2010/main" val="2089815583"/>
+      </p:ext>
+    </p:extLst>
+  </p:cSld>
+  <p:clrMapOvr>
+    <a:masterClrMapping/>
+  </p:clrMapOvr>
+</p:notes>
+</file>
+
+<file path=ppt/notesSlides/notesSlide3.xml><?xml version="1.0" encoding="utf-8"?>
+<p:notes xmlns:a="http://schemas.openxmlformats.org/drawingml/2006/main" xmlns:r="http://schemas.openxmlformats.org/officeDocument/2006/relationships" xmlns:p="http://schemas.openxmlformats.org/presentationml/2006/main">
+  <p:cSld>
+    <p:spTree>
+      <p:nvGrpSpPr>
+        <p:cNvPr id="1" name=""/>
+        <p:cNvGrpSpPr/>
+        <p:nvPr/>
+      </p:nvGrpSpPr>
+      <p:grpSpPr>
+        <a:xfrm>
+          <a:off x="0" y="0"/>
+          <a:ext cx="0" cy="0"/>
+          <a:chOff x="0" y="0"/>
+          <a:chExt cx="0" cy="0"/>
+        </a:xfrm>
+      </p:grpSpPr>
+      <p:sp>
+        <p:nvSpPr>
+          <p:cNvPr id="2" name="Marcador de Posição da Imagem do Diapositivo 1"/>
+          <p:cNvSpPr>
+            <a:spLocks noGrp="1" noRot="1" noChangeAspect="1"/>
+          </p:cNvSpPr>
+          <p:nvPr>
+            <p:ph type="sldImg"/>
+          </p:nvPr>
+        </p:nvSpPr>
+        <p:spPr/>
+      </p:sp>
+      <p:sp>
+        <p:nvSpPr>
+          <p:cNvPr id="3" name="Marcador de Posição de Notas 2"/>
+          <p:cNvSpPr>
+            <a:spLocks noGrp="1"/>
+          </p:cNvSpPr>
+          <p:nvPr>
+            <p:ph type="body" idx="1"/>
+          </p:nvPr>
+        </p:nvSpPr>
+        <p:spPr/>
+        <p:txBody>
+          <a:bodyPr/>
+          <a:lstStyle/>
+          <a:p>
+            <a:r>
+              <a:rPr lang="en-US" sz="1200" b="1" i="0" kern="1200" dirty="0" err="1" smtClean="0">
+                <a:solidFill>
+                  <a:schemeClr val="tx1"/>
+                </a:solidFill>
+                <a:effectLst/>
+                <a:latin typeface="+mn-lt"/>
+                <a:ea typeface="+mn-ea"/>
+                <a:cs typeface="+mn-cs"/>
+              </a:rPr>
+              <a:t>ZeroAccess</a:t>
+            </a:r>
+            <a:r>
+              <a:rPr lang="en-US" sz="1200" b="0" i="0" kern="1200" dirty="0" smtClean="0">
+                <a:solidFill>
+                  <a:schemeClr val="tx1"/>
+                </a:solidFill>
+                <a:effectLst/>
+                <a:latin typeface="+mn-lt"/>
+                <a:ea typeface="+mn-ea"/>
+                <a:cs typeface="+mn-cs"/>
+              </a:rPr>
+              <a:t> Est. no of bots: 2 000 000;  It uses a Trojan horse computer malware that affects Microsoft Windows operating systems and downloads other malware on an infected machine while remaining hidden by using rootkit techniques.</a:t>
+            </a:r>
+          </a:p>
+          <a:p>
+            <a:r>
+              <a:rPr lang="en-US" sz="1200" b="1" i="0" kern="1200" dirty="0" err="1" smtClean="0">
+                <a:solidFill>
+                  <a:schemeClr val="tx1"/>
+                </a:solidFill>
+                <a:effectLst/>
+                <a:latin typeface="+mn-lt"/>
+                <a:ea typeface="+mn-ea"/>
+                <a:cs typeface="+mn-cs"/>
+              </a:rPr>
+              <a:t>Nitol</a:t>
+            </a:r>
+            <a:r>
+              <a:rPr lang="en-US" sz="1200" b="0" i="0" kern="1200" dirty="0" smtClean="0">
+                <a:solidFill>
+                  <a:schemeClr val="tx1"/>
+                </a:solidFill>
+                <a:effectLst/>
+                <a:latin typeface="+mn-lt"/>
+                <a:ea typeface="+mn-ea"/>
+                <a:cs typeface="+mn-cs"/>
+              </a:rPr>
+              <a:t> Est. no of bots: unknown; The botnet is mostly prevalent in China where an estimate 85% of the infections are detected. It was found to be present on systems that came brand-new from the factory, indicating the </a:t>
+            </a:r>
+            <a:r>
+              <a:rPr lang="en-US" sz="1200" b="0" i="0" kern="1200" dirty="0" err="1" smtClean="0">
+                <a:solidFill>
+                  <a:schemeClr val="tx1"/>
+                </a:solidFill>
+                <a:effectLst/>
+                <a:latin typeface="+mn-lt"/>
+                <a:ea typeface="+mn-ea"/>
+                <a:cs typeface="+mn-cs"/>
+              </a:rPr>
+              <a:t>trojan</a:t>
+            </a:r>
+            <a:r>
+              <a:rPr lang="en-US" sz="1200" b="0" i="0" kern="1200" dirty="0" smtClean="0">
+                <a:solidFill>
+                  <a:schemeClr val="tx1"/>
+                </a:solidFill>
+                <a:effectLst/>
+                <a:latin typeface="+mn-lt"/>
+                <a:ea typeface="+mn-ea"/>
+                <a:cs typeface="+mn-cs"/>
+              </a:rPr>
+              <a:t> was installed somewhere during the assembly and manufacturing process.</a:t>
+            </a:r>
+          </a:p>
+          <a:p>
+            <a:r>
+              <a:rPr lang="en-US" sz="1200" b="1" i="0" kern="1200" dirty="0" err="1" smtClean="0">
+                <a:solidFill>
+                  <a:schemeClr val="tx1"/>
+                </a:solidFill>
+                <a:effectLst/>
+                <a:latin typeface="+mn-lt"/>
+                <a:ea typeface="+mn-ea"/>
+                <a:cs typeface="+mn-cs"/>
+              </a:rPr>
+              <a:t>Semalt</a:t>
+            </a:r>
+            <a:r>
+              <a:rPr lang="en-US" sz="1200" b="1" i="0" kern="1200" dirty="0" smtClean="0">
+                <a:solidFill>
+                  <a:schemeClr val="tx1"/>
+                </a:solidFill>
+                <a:effectLst/>
+                <a:latin typeface="+mn-lt"/>
+                <a:ea typeface="+mn-ea"/>
+                <a:cs typeface="+mn-cs"/>
+              </a:rPr>
+              <a:t> (aka </a:t>
+            </a:r>
+            <a:r>
+              <a:rPr lang="en-US" sz="1200" b="1" i="0" kern="1200" dirty="0" err="1" smtClean="0">
+                <a:solidFill>
+                  <a:schemeClr val="tx1"/>
+                </a:solidFill>
+                <a:effectLst/>
+                <a:latin typeface="+mn-lt"/>
+                <a:ea typeface="+mn-ea"/>
+                <a:cs typeface="+mn-cs"/>
+              </a:rPr>
+              <a:t>Soundfrost</a:t>
+            </a:r>
+            <a:r>
+              <a:rPr lang="en-US" sz="1200" b="1" i="0" kern="1200" dirty="0" smtClean="0">
+                <a:solidFill>
+                  <a:schemeClr val="tx1"/>
+                </a:solidFill>
+                <a:effectLst/>
+                <a:latin typeface="+mn-lt"/>
+                <a:ea typeface="+mn-ea"/>
+                <a:cs typeface="+mn-cs"/>
+              </a:rPr>
+              <a:t>)</a:t>
+            </a:r>
+            <a:r>
+              <a:rPr lang="en-US" sz="1200" b="0" i="0" kern="1200" dirty="0" smtClean="0">
+                <a:solidFill>
+                  <a:schemeClr val="tx1"/>
+                </a:solidFill>
+                <a:effectLst/>
+                <a:latin typeface="+mn-lt"/>
+                <a:ea typeface="+mn-ea"/>
+                <a:cs typeface="+mn-cs"/>
+              </a:rPr>
+              <a:t> Est. no of bots: 300 000+;</a:t>
+            </a:r>
+            <a:r>
+              <a:rPr lang="en-US" sz="1200" b="0" i="0" kern="1200" baseline="0" dirty="0" smtClean="0">
+                <a:solidFill>
+                  <a:schemeClr val="tx1"/>
+                </a:solidFill>
+                <a:effectLst/>
+                <a:latin typeface="+mn-lt"/>
+                <a:ea typeface="+mn-ea"/>
+                <a:cs typeface="+mn-cs"/>
+              </a:rPr>
+              <a:t> </a:t>
+            </a:r>
+            <a:r>
+              <a:rPr lang="en-US" sz="1200" b="0" i="0" kern="1200" dirty="0" err="1" smtClean="0">
+                <a:solidFill>
+                  <a:schemeClr val="tx1"/>
+                </a:solidFill>
+                <a:effectLst/>
+                <a:latin typeface="+mn-lt"/>
+                <a:ea typeface="+mn-ea"/>
+                <a:cs typeface="+mn-cs"/>
+              </a:rPr>
+              <a:t>Semalt</a:t>
+            </a:r>
+            <a:r>
+              <a:rPr lang="en-US" sz="1200" b="0" i="0" kern="1200" smtClean="0">
+                <a:solidFill>
+                  <a:schemeClr val="tx1"/>
+                </a:solidFill>
+                <a:effectLst/>
+                <a:latin typeface="+mn-lt"/>
+                <a:ea typeface="+mn-ea"/>
+                <a:cs typeface="+mn-cs"/>
+              </a:rPr>
+              <a:t> is a botnet mainly involved mainly involved in sending spam e-mails.</a:t>
+            </a:r>
+            <a:endParaRPr lang="en-US" sz="1200" b="0" i="0" kern="1200" dirty="0" smtClean="0">
+              <a:solidFill>
+                <a:schemeClr val="tx1"/>
+              </a:solidFill>
+              <a:effectLst/>
+              <a:latin typeface="+mn-lt"/>
+              <a:ea typeface="+mn-ea"/>
+              <a:cs typeface="+mn-cs"/>
+            </a:endParaRPr>
+          </a:p>
+          <a:p>
+            <a:endParaRPr lang="en-US" sz="1200" b="0" i="0" kern="1200" dirty="0" smtClean="0">
+              <a:solidFill>
+                <a:schemeClr val="tx1"/>
+              </a:solidFill>
+              <a:effectLst/>
+              <a:latin typeface="+mn-lt"/>
+              <a:ea typeface="+mn-ea"/>
+              <a:cs typeface="+mn-cs"/>
+            </a:endParaRPr>
+          </a:p>
+          <a:p>
+            <a:endParaRPr lang="pt-PT" dirty="0"/>
+          </a:p>
+        </p:txBody>
+      </p:sp>
+      <p:sp>
+        <p:nvSpPr>
+          <p:cNvPr id="4" name="Marcador de Posição do Número do Diapositivo 3"/>
+          <p:cNvSpPr>
+            <a:spLocks noGrp="1"/>
+          </p:cNvSpPr>
+          <p:nvPr>
+            <p:ph type="sldNum" sz="quarter" idx="10"/>
+          </p:nvPr>
+        </p:nvSpPr>
+        <p:spPr/>
+        <p:txBody>
+          <a:bodyPr/>
+          <a:lstStyle/>
+          <a:p>
+            <a:fld id="{D53CEB6E-A33F-4E49-B64C-131A700B84D4}" type="slidenum">
+              <a:rPr lang="pt-PT" smtClean="0"/>
+              <a:t>11</a:t>
+            </a:fld>
+            <a:endParaRPr lang="pt-PT"/>
+          </a:p>
+        </p:txBody>
+      </p:sp>
+    </p:spTree>
+    <p:extLst>
+      <p:ext uri="{BB962C8B-B14F-4D97-AF65-F5344CB8AC3E}">
+        <p14:creationId xmlns:p14="http://schemas.microsoft.com/office/powerpoint/2010/main" val="956097716"/>
+      </p:ext>
+    </p:extLst>
+  </p:cSld>
+  <p:clrMapOvr>
+    <a:masterClrMapping/>
+  </p:clrMapOvr>
+</p:notes>
+</file>
+
+<file path=ppt/notesSlides/notesSlide4.xml><?xml version="1.0" encoding="utf-8"?>
 <p:notes xmlns:a="http://schemas.openxmlformats.org/drawingml/2006/main" xmlns:r="http://schemas.openxmlformats.org/officeDocument/2006/relationships" xmlns:p="http://schemas.openxmlformats.org/presentationml/2006/main">
   <p:cSld>
     <p:spTree>
@@ -23157,7 +24278,7 @@
             <a:fld id="{4FAB73BC-B049-4115-A692-8D63A059BFB8}" type="slidenum">
               <a:rPr lang="en-US" smtClean="0"/>
               <a:pPr/>
-              <a:t>‹#›</a:t>
+              <a:t>‹nº›</a:t>
             </a:fld>
             <a:endParaRPr lang="en-US" dirty="0"/>
           </a:p>
@@ -23335,7 +24456,7 @@
           <a:p>
             <a:fld id="{4FAB73BC-B049-4115-A692-8D63A059BFB8}" type="slidenum">
               <a:rPr lang="en-US" smtClean="0"/>
-              <a:t>‹#›</a:t>
+              <a:t>‹nº›</a:t>
             </a:fld>
             <a:endParaRPr lang="en-US" dirty="0"/>
           </a:p>
@@ -23523,7 +24644,7 @@
           <a:p>
             <a:fld id="{4FAB73BC-B049-4115-A692-8D63A059BFB8}" type="slidenum">
               <a:rPr lang="en-US" smtClean="0"/>
-              <a:t>‹#›</a:t>
+              <a:t>‹nº›</a:t>
             </a:fld>
             <a:endParaRPr lang="en-US" dirty="0"/>
           </a:p>
@@ -23709,7 +24830,7 @@
           <a:p>
             <a:fld id="{4FAB73BC-B049-4115-A692-8D63A059BFB8}" type="slidenum">
               <a:rPr lang="en-US" smtClean="0"/>
-              <a:t>‹#›</a:t>
+              <a:t>‹nº›</a:t>
             </a:fld>
             <a:endParaRPr lang="en-US" dirty="0"/>
           </a:p>
@@ -24014,7 +25135,7 @@
             <a:fld id="{4FAB73BC-B049-4115-A692-8D63A059BFB8}" type="slidenum">
               <a:rPr lang="en-US" smtClean="0"/>
               <a:pPr/>
-              <a:t>‹#›</a:t>
+              <a:t>‹nº›</a:t>
             </a:fld>
             <a:endParaRPr lang="en-US" dirty="0"/>
           </a:p>
@@ -24305,7 +25426,7 @@
           <a:p>
             <a:fld id="{4FAB73BC-B049-4115-A692-8D63A059BFB8}" type="slidenum">
               <a:rPr lang="en-US" smtClean="0"/>
-              <a:t>‹#›</a:t>
+              <a:t>‹nº›</a:t>
             </a:fld>
             <a:endParaRPr lang="en-US" dirty="0"/>
           </a:p>
@@ -24709,7 +25830,7 @@
           <a:p>
             <a:fld id="{4FAB73BC-B049-4115-A692-8D63A059BFB8}" type="slidenum">
               <a:rPr lang="en-US" smtClean="0"/>
-              <a:t>‹#›</a:t>
+              <a:t>‹nº›</a:t>
             </a:fld>
             <a:endParaRPr lang="en-US" dirty="0"/>
           </a:p>
@@ -24898,7 +26019,7 @@
           <a:p>
             <a:fld id="{4FAB73BC-B049-4115-A692-8D63A059BFB8}" type="slidenum">
               <a:rPr lang="en-US" smtClean="0"/>
-              <a:t>‹#›</a:t>
+              <a:t>‹nº›</a:t>
             </a:fld>
             <a:endParaRPr lang="en-US" dirty="0"/>
           </a:p>
@@ -25024,7 +26145,7 @@
           <a:p>
             <a:fld id="{4FAB73BC-B049-4115-A692-8D63A059BFB8}" type="slidenum">
               <a:rPr lang="en-US" smtClean="0"/>
-              <a:t>‹#›</a:t>
+              <a:t>‹nº›</a:t>
             </a:fld>
             <a:endParaRPr lang="en-US" dirty="0"/>
           </a:p>
@@ -25317,7 +26438,7 @@
             <a:fld id="{4FAB73BC-B049-4115-A692-8D63A059BFB8}" type="slidenum">
               <a:rPr lang="en-US" smtClean="0"/>
               <a:pPr/>
-              <a:t>‹#›</a:t>
+              <a:t>‹nº›</a:t>
             </a:fld>
             <a:endParaRPr lang="en-US" dirty="0"/>
           </a:p>
@@ -25591,7 +26712,7 @@
             <a:fld id="{4FAB73BC-B049-4115-A692-8D63A059BFB8}" type="slidenum">
               <a:rPr lang="en-US" smtClean="0"/>
               <a:pPr/>
-              <a:t>‹#›</a:t>
+              <a:t>‹nº›</a:t>
             </a:fld>
             <a:endParaRPr lang="en-US" dirty="0"/>
           </a:p>
@@ -25807,7 +26928,7 @@
             <a:fld id="{4FAB73BC-B049-4115-A692-8D63A059BFB8}" type="slidenum">
               <a:rPr lang="en-US" smtClean="0"/>
               <a:pPr/>
-              <a:t>‹#›</a:t>
+              <a:t>‹nº›</a:t>
             </a:fld>
             <a:endParaRPr lang="en-US" dirty="0"/>
           </a:p>
@@ -26299,7 +27420,7 @@
         </p:xfrm>
         <a:graphic>
           <a:graphicData uri="http://schemas.openxmlformats.org/drawingml/2006/diagram">
-            <dgm:relIds xmlns:dgm="http://schemas.openxmlformats.org/drawingml/2006/diagram" xmlns:r="http://schemas.openxmlformats.org/officeDocument/2006/relationships" r:dm="rId2" r:lo="rId3" r:qs="rId4" r:cs="rId5"/>
+            <dgm:relIds xmlns:dgm="http://schemas.openxmlformats.org/drawingml/2006/diagram" xmlns:r="http://schemas.openxmlformats.org/officeDocument/2006/relationships" r:dm="rId3" r:lo="rId4" r:qs="rId5" r:cs="rId6"/>
           </a:graphicData>
         </a:graphic>
       </p:graphicFrame>
@@ -26377,7 +27498,7 @@
         </p:xfrm>
         <a:graphic>
           <a:graphicData uri="http://schemas.openxmlformats.org/drawingml/2006/diagram">
-            <dgm:relIds xmlns:dgm="http://schemas.openxmlformats.org/drawingml/2006/diagram" xmlns:r="http://schemas.openxmlformats.org/officeDocument/2006/relationships" r:dm="rId2" r:lo="rId3" r:qs="rId4" r:cs="rId5"/>
+            <dgm:relIds xmlns:dgm="http://schemas.openxmlformats.org/drawingml/2006/diagram" xmlns:r="http://schemas.openxmlformats.org/officeDocument/2006/relationships" r:dm="rId3" r:lo="rId4" r:qs="rId5" r:cs="rId6"/>
           </a:graphicData>
         </a:graphic>
       </p:graphicFrame>
@@ -27248,7 +28369,6 @@
               <a:rPr lang="en-US" dirty="0" smtClean="0"/>
               <a:t>Demo</a:t>
             </a:r>
-            <a:endParaRPr lang="en-US" dirty="0" smtClean="0"/>
           </a:p>
           <a:p>
             <a:endParaRPr lang="pt-PT" dirty="0"/>
@@ -28014,7 +29134,7 @@
         </p:xfrm>
         <a:graphic>
           <a:graphicData uri="http://schemas.openxmlformats.org/drawingml/2006/diagram">
-            <dgm:relIds xmlns:dgm="http://schemas.openxmlformats.org/drawingml/2006/diagram" xmlns:r="http://schemas.openxmlformats.org/officeDocument/2006/relationships" r:dm="rId2" r:lo="rId3" r:qs="rId4" r:cs="rId5"/>
+            <dgm:relIds xmlns:dgm="http://schemas.openxmlformats.org/drawingml/2006/diagram" xmlns:r="http://schemas.openxmlformats.org/officeDocument/2006/relationships" r:dm="rId3" r:lo="rId4" r:qs="rId5" r:cs="rId6"/>
           </a:graphicData>
         </a:graphic>
       </p:graphicFrame>

</xml_diff>